<commit_message>
finished slides for USER, MESSAGE, CHAT, and UNIT TESTING
</commit_message>
<xml_diff>
--- a/Phase 3 Documents/chatRelayFinalPresentationSlides.pptx
+++ b/Phase 3 Documents/chatRelayFinalPresentationSlides.pptx
@@ -9,6 +9,20 @@
   </p:notesMasterIdLst>
   <p:sldIdLst>
     <p:sldId id="256" r:id="rId6"/>
+    <p:sldId id="257" r:id="rId7"/>
+    <p:sldId id="258" r:id="rId8"/>
+    <p:sldId id="259" r:id="rId9"/>
+    <p:sldId id="260" r:id="rId10"/>
+    <p:sldId id="261" r:id="rId11"/>
+    <p:sldId id="262" r:id="rId12"/>
+    <p:sldId id="263" r:id="rId13"/>
+    <p:sldId id="264" r:id="rId14"/>
+    <p:sldId id="265" r:id="rId15"/>
+    <p:sldId id="266" r:id="rId16"/>
+    <p:sldId id="267" r:id="rId17"/>
+    <p:sldId id="268" r:id="rId18"/>
+    <p:sldId id="269" r:id="rId19"/>
+    <p:sldId id="270" r:id="rId20"/>
   </p:sldIdLst>
   <p:sldSz cy="5143500" cx="9144000"/>
   <p:notesSz cx="6858000" cy="9144000"/>
@@ -741,6 +755,1392 @@
       <p:sp>
         <p:nvSpPr>
           <p:cNvPr id="52" name="Google Shape;52;p:notes"/>
+          <p:cNvSpPr txBox="1"/>
+          <p:nvPr>
+            <p:ph idx="1" type="body"/>
+          </p:nvPr>
+        </p:nvSpPr>
+        <p:spPr>
+          <a:xfrm>
+            <a:off x="685800" y="4343400"/>
+            <a:ext cx="5486400" cy="4114800"/>
+          </a:xfrm>
+          <a:prstGeom prst="rect">
+            <a:avLst/>
+          </a:prstGeom>
+        </p:spPr>
+        <p:txBody>
+          <a:bodyPr anchorCtr="0" anchor="t" bIns="91425" lIns="91425" spcFirstLastPara="1" rIns="91425" wrap="square" tIns="91425">
+            <a:noAutofit/>
+          </a:bodyPr>
+          <a:lstStyle/>
+          <a:p>
+            <a:pPr indent="0" lvl="0" marL="0" rtl="0" algn="l">
+              <a:spcBef>
+                <a:spcPts val="0"/>
+              </a:spcBef>
+              <a:spcAft>
+                <a:spcPts val="0"/>
+              </a:spcAft>
+              <a:buNone/>
+            </a:pPr>
+            <a:r>
+              <a:t/>
+            </a:r>
+            <a:endParaRPr/>
+          </a:p>
+        </p:txBody>
+      </p:sp>
+    </p:spTree>
+  </p:cSld>
+  <p:clrMapOvr>
+    <a:masterClrMapping/>
+  </p:clrMapOvr>
+</p:notes>
+</file>
+
+<file path=ppt/notesSlides/notesSlide10.xml><?xml version="1.0" encoding="utf-8"?>
+<p:notes xmlns:a="http://schemas.openxmlformats.org/drawingml/2006/main" xmlns:r="http://schemas.openxmlformats.org/officeDocument/2006/relationships" xmlns:mc="http://schemas.openxmlformats.org/markup-compatibility/2006" xmlns:mv="urn:schemas-microsoft-com:mac:vml" xmlns:p="http://schemas.openxmlformats.org/presentationml/2006/main" xmlns:c="http://schemas.openxmlformats.org/drawingml/2006/chart" xmlns:dgm="http://schemas.openxmlformats.org/drawingml/2006/diagram" xmlns:o="urn:schemas-microsoft-com:office:office" xmlns:v="urn:schemas-microsoft-com:vml" xmlns:pvml="urn:schemas-microsoft-com:office:powerpoint" xmlns:com="http://schemas.openxmlformats.org/drawingml/2006/compatibility" xmlns:p14="http://schemas.microsoft.com/office/powerpoint/2010/main" xmlns:p15="http://schemas.microsoft.com/office/powerpoint/2012/main" xmlns:ahyp="http://schemas.microsoft.com/office/drawing/2018/hyperlinkcolor" showMasterPhAnim="0" showMasterSp="0">
+  <p:cSld>
+    <p:spTree>
+      <p:nvGrpSpPr>
+        <p:cNvPr id="104" name="Shape 104"/>
+        <p:cNvGrpSpPr/>
+        <p:nvPr/>
+      </p:nvGrpSpPr>
+      <p:grpSpPr>
+        <a:xfrm>
+          <a:off x="0" y="0"/>
+          <a:ext cx="0" cy="0"/>
+          <a:chOff x="0" y="0"/>
+          <a:chExt cx="0" cy="0"/>
+        </a:xfrm>
+      </p:grpSpPr>
+      <p:sp>
+        <p:nvSpPr>
+          <p:cNvPr id="105" name="Google Shape;105;g355374deb38_2_2:notes"/>
+          <p:cNvSpPr/>
+          <p:nvPr>
+            <p:ph idx="2" type="sldImg"/>
+          </p:nvPr>
+        </p:nvSpPr>
+        <p:spPr>
+          <a:xfrm>
+            <a:off x="381300" y="685800"/>
+            <a:ext cx="6096000" cy="3429000"/>
+          </a:xfrm>
+          <a:custGeom>
+            <a:rect b="b" l="l" r="r" t="t"/>
+            <a:pathLst>
+              <a:path extrusionOk="0" h="120000" w="120000">
+                <a:moveTo>
+                  <a:pt x="0" y="0"/>
+                </a:moveTo>
+                <a:lnTo>
+                  <a:pt x="120000" y="0"/>
+                </a:lnTo>
+                <a:lnTo>
+                  <a:pt x="120000" y="120000"/>
+                </a:lnTo>
+                <a:lnTo>
+                  <a:pt x="0" y="120000"/>
+                </a:lnTo>
+                <a:close/>
+              </a:path>
+            </a:pathLst>
+          </a:custGeom>
+        </p:spPr>
+      </p:sp>
+      <p:sp>
+        <p:nvSpPr>
+          <p:cNvPr id="106" name="Google Shape;106;g355374deb38_2_2:notes"/>
+          <p:cNvSpPr txBox="1"/>
+          <p:nvPr>
+            <p:ph idx="1" type="body"/>
+          </p:nvPr>
+        </p:nvSpPr>
+        <p:spPr>
+          <a:xfrm>
+            <a:off x="685800" y="4343400"/>
+            <a:ext cx="5486400" cy="4114800"/>
+          </a:xfrm>
+          <a:prstGeom prst="rect">
+            <a:avLst/>
+          </a:prstGeom>
+        </p:spPr>
+        <p:txBody>
+          <a:bodyPr anchorCtr="0" anchor="t" bIns="91425" lIns="91425" spcFirstLastPara="1" rIns="91425" wrap="square" tIns="91425">
+            <a:noAutofit/>
+          </a:bodyPr>
+          <a:lstStyle/>
+          <a:p>
+            <a:pPr indent="0" lvl="0" marL="0" rtl="0" algn="l">
+              <a:spcBef>
+                <a:spcPts val="0"/>
+              </a:spcBef>
+              <a:spcAft>
+                <a:spcPts val="0"/>
+              </a:spcAft>
+              <a:buNone/>
+            </a:pPr>
+            <a:r>
+              <a:t/>
+            </a:r>
+            <a:endParaRPr/>
+          </a:p>
+        </p:txBody>
+      </p:sp>
+    </p:spTree>
+  </p:cSld>
+  <p:clrMapOvr>
+    <a:masterClrMapping/>
+  </p:clrMapOvr>
+</p:notes>
+</file>
+
+<file path=ppt/notesSlides/notesSlide11.xml><?xml version="1.0" encoding="utf-8"?>
+<p:notes xmlns:a="http://schemas.openxmlformats.org/drawingml/2006/main" xmlns:r="http://schemas.openxmlformats.org/officeDocument/2006/relationships" xmlns:mc="http://schemas.openxmlformats.org/markup-compatibility/2006" xmlns:mv="urn:schemas-microsoft-com:mac:vml" xmlns:p="http://schemas.openxmlformats.org/presentationml/2006/main" xmlns:c="http://schemas.openxmlformats.org/drawingml/2006/chart" xmlns:dgm="http://schemas.openxmlformats.org/drawingml/2006/diagram" xmlns:o="urn:schemas-microsoft-com:office:office" xmlns:v="urn:schemas-microsoft-com:vml" xmlns:pvml="urn:schemas-microsoft-com:office:powerpoint" xmlns:com="http://schemas.openxmlformats.org/drawingml/2006/compatibility" xmlns:p14="http://schemas.microsoft.com/office/powerpoint/2010/main" xmlns:p15="http://schemas.microsoft.com/office/powerpoint/2012/main" xmlns:ahyp="http://schemas.microsoft.com/office/drawing/2018/hyperlinkcolor" showMasterPhAnim="0" showMasterSp="0">
+  <p:cSld>
+    <p:spTree>
+      <p:nvGrpSpPr>
+        <p:cNvPr id="110" name="Shape 110"/>
+        <p:cNvGrpSpPr/>
+        <p:nvPr/>
+      </p:nvGrpSpPr>
+      <p:grpSpPr>
+        <a:xfrm>
+          <a:off x="0" y="0"/>
+          <a:ext cx="0" cy="0"/>
+          <a:chOff x="0" y="0"/>
+          <a:chExt cx="0" cy="0"/>
+        </a:xfrm>
+      </p:grpSpPr>
+      <p:sp>
+        <p:nvSpPr>
+          <p:cNvPr id="111" name="Google Shape;111;g355374deb38_2_9:notes"/>
+          <p:cNvSpPr/>
+          <p:nvPr>
+            <p:ph idx="2" type="sldImg"/>
+          </p:nvPr>
+        </p:nvSpPr>
+        <p:spPr>
+          <a:xfrm>
+            <a:off x="381300" y="685800"/>
+            <a:ext cx="6096000" cy="3429000"/>
+          </a:xfrm>
+          <a:custGeom>
+            <a:rect b="b" l="l" r="r" t="t"/>
+            <a:pathLst>
+              <a:path extrusionOk="0" h="120000" w="120000">
+                <a:moveTo>
+                  <a:pt x="0" y="0"/>
+                </a:moveTo>
+                <a:lnTo>
+                  <a:pt x="120000" y="0"/>
+                </a:lnTo>
+                <a:lnTo>
+                  <a:pt x="120000" y="120000"/>
+                </a:lnTo>
+                <a:lnTo>
+                  <a:pt x="0" y="120000"/>
+                </a:lnTo>
+                <a:close/>
+              </a:path>
+            </a:pathLst>
+          </a:custGeom>
+        </p:spPr>
+      </p:sp>
+      <p:sp>
+        <p:nvSpPr>
+          <p:cNvPr id="112" name="Google Shape;112;g355374deb38_2_9:notes"/>
+          <p:cNvSpPr txBox="1"/>
+          <p:nvPr>
+            <p:ph idx="1" type="body"/>
+          </p:nvPr>
+        </p:nvSpPr>
+        <p:spPr>
+          <a:xfrm>
+            <a:off x="685800" y="4343400"/>
+            <a:ext cx="5486400" cy="4114800"/>
+          </a:xfrm>
+          <a:prstGeom prst="rect">
+            <a:avLst/>
+          </a:prstGeom>
+        </p:spPr>
+        <p:txBody>
+          <a:bodyPr anchorCtr="0" anchor="t" bIns="91425" lIns="91425" spcFirstLastPara="1" rIns="91425" wrap="square" tIns="91425">
+            <a:noAutofit/>
+          </a:bodyPr>
+          <a:lstStyle/>
+          <a:p>
+            <a:pPr indent="0" lvl="0" marL="0" rtl="0" algn="l">
+              <a:spcBef>
+                <a:spcPts val="0"/>
+              </a:spcBef>
+              <a:spcAft>
+                <a:spcPts val="0"/>
+              </a:spcAft>
+              <a:buNone/>
+            </a:pPr>
+            <a:r>
+              <a:t/>
+            </a:r>
+            <a:endParaRPr/>
+          </a:p>
+        </p:txBody>
+      </p:sp>
+    </p:spTree>
+  </p:cSld>
+  <p:clrMapOvr>
+    <a:masterClrMapping/>
+  </p:clrMapOvr>
+</p:notes>
+</file>
+
+<file path=ppt/notesSlides/notesSlide12.xml><?xml version="1.0" encoding="utf-8"?>
+<p:notes xmlns:a="http://schemas.openxmlformats.org/drawingml/2006/main" xmlns:r="http://schemas.openxmlformats.org/officeDocument/2006/relationships" xmlns:mc="http://schemas.openxmlformats.org/markup-compatibility/2006" xmlns:mv="urn:schemas-microsoft-com:mac:vml" xmlns:p="http://schemas.openxmlformats.org/presentationml/2006/main" xmlns:c="http://schemas.openxmlformats.org/drawingml/2006/chart" xmlns:dgm="http://schemas.openxmlformats.org/drawingml/2006/diagram" xmlns:o="urn:schemas-microsoft-com:office:office" xmlns:v="urn:schemas-microsoft-com:vml" xmlns:pvml="urn:schemas-microsoft-com:office:powerpoint" xmlns:com="http://schemas.openxmlformats.org/drawingml/2006/compatibility" xmlns:p14="http://schemas.microsoft.com/office/powerpoint/2010/main" xmlns:p15="http://schemas.microsoft.com/office/powerpoint/2012/main" xmlns:ahyp="http://schemas.microsoft.com/office/drawing/2018/hyperlinkcolor" showMasterPhAnim="0" showMasterSp="0">
+  <p:cSld>
+    <p:spTree>
+      <p:nvGrpSpPr>
+        <p:cNvPr id="117" name="Shape 117"/>
+        <p:cNvGrpSpPr/>
+        <p:nvPr/>
+      </p:nvGrpSpPr>
+      <p:grpSpPr>
+        <a:xfrm>
+          <a:off x="0" y="0"/>
+          <a:ext cx="0" cy="0"/>
+          <a:chOff x="0" y="0"/>
+          <a:chExt cx="0" cy="0"/>
+        </a:xfrm>
+      </p:grpSpPr>
+      <p:sp>
+        <p:nvSpPr>
+          <p:cNvPr id="118" name="Google Shape;118;g35530506554_0_15:notes"/>
+          <p:cNvSpPr/>
+          <p:nvPr>
+            <p:ph idx="2" type="sldImg"/>
+          </p:nvPr>
+        </p:nvSpPr>
+        <p:spPr>
+          <a:xfrm>
+            <a:off x="381300" y="685800"/>
+            <a:ext cx="6096000" cy="3429000"/>
+          </a:xfrm>
+          <a:custGeom>
+            <a:rect b="b" l="l" r="r" t="t"/>
+            <a:pathLst>
+              <a:path extrusionOk="0" h="120000" w="120000">
+                <a:moveTo>
+                  <a:pt x="0" y="0"/>
+                </a:moveTo>
+                <a:lnTo>
+                  <a:pt x="120000" y="0"/>
+                </a:lnTo>
+                <a:lnTo>
+                  <a:pt x="120000" y="120000"/>
+                </a:lnTo>
+                <a:lnTo>
+                  <a:pt x="0" y="120000"/>
+                </a:lnTo>
+                <a:close/>
+              </a:path>
+            </a:pathLst>
+          </a:custGeom>
+        </p:spPr>
+      </p:sp>
+      <p:sp>
+        <p:nvSpPr>
+          <p:cNvPr id="119" name="Google Shape;119;g35530506554_0_15:notes"/>
+          <p:cNvSpPr txBox="1"/>
+          <p:nvPr>
+            <p:ph idx="1" type="body"/>
+          </p:nvPr>
+        </p:nvSpPr>
+        <p:spPr>
+          <a:xfrm>
+            <a:off x="685800" y="4343400"/>
+            <a:ext cx="5486400" cy="4114800"/>
+          </a:xfrm>
+          <a:prstGeom prst="rect">
+            <a:avLst/>
+          </a:prstGeom>
+        </p:spPr>
+        <p:txBody>
+          <a:bodyPr anchorCtr="0" anchor="t" bIns="91425" lIns="91425" spcFirstLastPara="1" rIns="91425" wrap="square" tIns="91425">
+            <a:noAutofit/>
+          </a:bodyPr>
+          <a:lstStyle/>
+          <a:p>
+            <a:pPr indent="0" lvl="0" marL="0" rtl="0" algn="l">
+              <a:spcBef>
+                <a:spcPts val="0"/>
+              </a:spcBef>
+              <a:spcAft>
+                <a:spcPts val="0"/>
+              </a:spcAft>
+              <a:buNone/>
+            </a:pPr>
+            <a:r>
+              <a:t/>
+            </a:r>
+            <a:endParaRPr/>
+          </a:p>
+        </p:txBody>
+      </p:sp>
+    </p:spTree>
+  </p:cSld>
+  <p:clrMapOvr>
+    <a:masterClrMapping/>
+  </p:clrMapOvr>
+</p:notes>
+</file>
+
+<file path=ppt/notesSlides/notesSlide13.xml><?xml version="1.0" encoding="utf-8"?>
+<p:notes xmlns:a="http://schemas.openxmlformats.org/drawingml/2006/main" xmlns:r="http://schemas.openxmlformats.org/officeDocument/2006/relationships" xmlns:mc="http://schemas.openxmlformats.org/markup-compatibility/2006" xmlns:mv="urn:schemas-microsoft-com:mac:vml" xmlns:p="http://schemas.openxmlformats.org/presentationml/2006/main" xmlns:c="http://schemas.openxmlformats.org/drawingml/2006/chart" xmlns:dgm="http://schemas.openxmlformats.org/drawingml/2006/diagram" xmlns:o="urn:schemas-microsoft-com:office:office" xmlns:v="urn:schemas-microsoft-com:vml" xmlns:pvml="urn:schemas-microsoft-com:office:powerpoint" xmlns:com="http://schemas.openxmlformats.org/drawingml/2006/compatibility" xmlns:p14="http://schemas.microsoft.com/office/powerpoint/2010/main" xmlns:p15="http://schemas.microsoft.com/office/powerpoint/2012/main" xmlns:ahyp="http://schemas.microsoft.com/office/drawing/2018/hyperlinkcolor" showMasterPhAnim="0" showMasterSp="0">
+  <p:cSld>
+    <p:spTree>
+      <p:nvGrpSpPr>
+        <p:cNvPr id="126" name="Shape 126"/>
+        <p:cNvGrpSpPr/>
+        <p:nvPr/>
+      </p:nvGrpSpPr>
+      <p:grpSpPr>
+        <a:xfrm>
+          <a:off x="0" y="0"/>
+          <a:ext cx="0" cy="0"/>
+          <a:chOff x="0" y="0"/>
+          <a:chExt cx="0" cy="0"/>
+        </a:xfrm>
+      </p:grpSpPr>
+      <p:sp>
+        <p:nvSpPr>
+          <p:cNvPr id="127" name="Google Shape;127;g35530506554_0_55:notes"/>
+          <p:cNvSpPr/>
+          <p:nvPr>
+            <p:ph idx="2" type="sldImg"/>
+          </p:nvPr>
+        </p:nvSpPr>
+        <p:spPr>
+          <a:xfrm>
+            <a:off x="381300" y="685800"/>
+            <a:ext cx="6096000" cy="3429000"/>
+          </a:xfrm>
+          <a:custGeom>
+            <a:rect b="b" l="l" r="r" t="t"/>
+            <a:pathLst>
+              <a:path extrusionOk="0" h="120000" w="120000">
+                <a:moveTo>
+                  <a:pt x="0" y="0"/>
+                </a:moveTo>
+                <a:lnTo>
+                  <a:pt x="120000" y="0"/>
+                </a:lnTo>
+                <a:lnTo>
+                  <a:pt x="120000" y="120000"/>
+                </a:lnTo>
+                <a:lnTo>
+                  <a:pt x="0" y="120000"/>
+                </a:lnTo>
+                <a:close/>
+              </a:path>
+            </a:pathLst>
+          </a:custGeom>
+        </p:spPr>
+      </p:sp>
+      <p:sp>
+        <p:nvSpPr>
+          <p:cNvPr id="128" name="Google Shape;128;g35530506554_0_55:notes"/>
+          <p:cNvSpPr txBox="1"/>
+          <p:nvPr>
+            <p:ph idx="1" type="body"/>
+          </p:nvPr>
+        </p:nvSpPr>
+        <p:spPr>
+          <a:xfrm>
+            <a:off x="685800" y="4343400"/>
+            <a:ext cx="5486400" cy="4114800"/>
+          </a:xfrm>
+          <a:prstGeom prst="rect">
+            <a:avLst/>
+          </a:prstGeom>
+        </p:spPr>
+        <p:txBody>
+          <a:bodyPr anchorCtr="0" anchor="t" bIns="91425" lIns="91425" spcFirstLastPara="1" rIns="91425" wrap="square" tIns="91425">
+            <a:noAutofit/>
+          </a:bodyPr>
+          <a:lstStyle/>
+          <a:p>
+            <a:pPr indent="0" lvl="0" marL="0" rtl="0" algn="l">
+              <a:spcBef>
+                <a:spcPts val="0"/>
+              </a:spcBef>
+              <a:spcAft>
+                <a:spcPts val="0"/>
+              </a:spcAft>
+              <a:buNone/>
+            </a:pPr>
+            <a:r>
+              <a:t/>
+            </a:r>
+            <a:endParaRPr/>
+          </a:p>
+        </p:txBody>
+      </p:sp>
+    </p:spTree>
+  </p:cSld>
+  <p:clrMapOvr>
+    <a:masterClrMapping/>
+  </p:clrMapOvr>
+</p:notes>
+</file>
+
+<file path=ppt/notesSlides/notesSlide14.xml><?xml version="1.0" encoding="utf-8"?>
+<p:notes xmlns:a="http://schemas.openxmlformats.org/drawingml/2006/main" xmlns:r="http://schemas.openxmlformats.org/officeDocument/2006/relationships" xmlns:mc="http://schemas.openxmlformats.org/markup-compatibility/2006" xmlns:mv="urn:schemas-microsoft-com:mac:vml" xmlns:p="http://schemas.openxmlformats.org/presentationml/2006/main" xmlns:c="http://schemas.openxmlformats.org/drawingml/2006/chart" xmlns:dgm="http://schemas.openxmlformats.org/drawingml/2006/diagram" xmlns:o="urn:schemas-microsoft-com:office:office" xmlns:v="urn:schemas-microsoft-com:vml" xmlns:pvml="urn:schemas-microsoft-com:office:powerpoint" xmlns:com="http://schemas.openxmlformats.org/drawingml/2006/compatibility" xmlns:p14="http://schemas.microsoft.com/office/powerpoint/2010/main" xmlns:p15="http://schemas.microsoft.com/office/powerpoint/2012/main" xmlns:ahyp="http://schemas.microsoft.com/office/drawing/2018/hyperlinkcolor" showMasterPhAnim="0" showMasterSp="0">
+  <p:cSld>
+    <p:spTree>
+      <p:nvGrpSpPr>
+        <p:cNvPr id="133" name="Shape 133"/>
+        <p:cNvGrpSpPr/>
+        <p:nvPr/>
+      </p:nvGrpSpPr>
+      <p:grpSpPr>
+        <a:xfrm>
+          <a:off x="0" y="0"/>
+          <a:ext cx="0" cy="0"/>
+          <a:chOff x="0" y="0"/>
+          <a:chExt cx="0" cy="0"/>
+        </a:xfrm>
+      </p:grpSpPr>
+      <p:sp>
+        <p:nvSpPr>
+          <p:cNvPr id="134" name="Google Shape;134;g3552c095314_0_3:notes"/>
+          <p:cNvSpPr/>
+          <p:nvPr>
+            <p:ph idx="2" type="sldImg"/>
+          </p:nvPr>
+        </p:nvSpPr>
+        <p:spPr>
+          <a:xfrm>
+            <a:off x="381300" y="685800"/>
+            <a:ext cx="6096000" cy="3429000"/>
+          </a:xfrm>
+          <a:custGeom>
+            <a:rect b="b" l="l" r="r" t="t"/>
+            <a:pathLst>
+              <a:path extrusionOk="0" h="120000" w="120000">
+                <a:moveTo>
+                  <a:pt x="0" y="0"/>
+                </a:moveTo>
+                <a:lnTo>
+                  <a:pt x="120000" y="0"/>
+                </a:lnTo>
+                <a:lnTo>
+                  <a:pt x="120000" y="120000"/>
+                </a:lnTo>
+                <a:lnTo>
+                  <a:pt x="0" y="120000"/>
+                </a:lnTo>
+                <a:close/>
+              </a:path>
+            </a:pathLst>
+          </a:custGeom>
+        </p:spPr>
+      </p:sp>
+      <p:sp>
+        <p:nvSpPr>
+          <p:cNvPr id="135" name="Google Shape;135;g3552c095314_0_3:notes"/>
+          <p:cNvSpPr txBox="1"/>
+          <p:nvPr>
+            <p:ph idx="1" type="body"/>
+          </p:nvPr>
+        </p:nvSpPr>
+        <p:spPr>
+          <a:xfrm>
+            <a:off x="685800" y="4343400"/>
+            <a:ext cx="5486400" cy="4114800"/>
+          </a:xfrm>
+          <a:prstGeom prst="rect">
+            <a:avLst/>
+          </a:prstGeom>
+        </p:spPr>
+        <p:txBody>
+          <a:bodyPr anchorCtr="0" anchor="t" bIns="91425" lIns="91425" spcFirstLastPara="1" rIns="91425" wrap="square" tIns="91425">
+            <a:noAutofit/>
+          </a:bodyPr>
+          <a:lstStyle/>
+          <a:p>
+            <a:pPr indent="0" lvl="0" marL="0" rtl="0" algn="l">
+              <a:spcBef>
+                <a:spcPts val="0"/>
+              </a:spcBef>
+              <a:spcAft>
+                <a:spcPts val="0"/>
+              </a:spcAft>
+              <a:buNone/>
+            </a:pPr>
+            <a:r>
+              <a:t/>
+            </a:r>
+            <a:endParaRPr/>
+          </a:p>
+        </p:txBody>
+      </p:sp>
+    </p:spTree>
+  </p:cSld>
+  <p:clrMapOvr>
+    <a:masterClrMapping/>
+  </p:clrMapOvr>
+</p:notes>
+</file>
+
+<file path=ppt/notesSlides/notesSlide15.xml><?xml version="1.0" encoding="utf-8"?>
+<p:notes xmlns:a="http://schemas.openxmlformats.org/drawingml/2006/main" xmlns:r="http://schemas.openxmlformats.org/officeDocument/2006/relationships" xmlns:mc="http://schemas.openxmlformats.org/markup-compatibility/2006" xmlns:mv="urn:schemas-microsoft-com:mac:vml" xmlns:p="http://schemas.openxmlformats.org/presentationml/2006/main" xmlns:c="http://schemas.openxmlformats.org/drawingml/2006/chart" xmlns:dgm="http://schemas.openxmlformats.org/drawingml/2006/diagram" xmlns:o="urn:schemas-microsoft-com:office:office" xmlns:v="urn:schemas-microsoft-com:vml" xmlns:pvml="urn:schemas-microsoft-com:office:powerpoint" xmlns:com="http://schemas.openxmlformats.org/drawingml/2006/compatibility" xmlns:p14="http://schemas.microsoft.com/office/powerpoint/2010/main" xmlns:p15="http://schemas.microsoft.com/office/powerpoint/2012/main" xmlns:ahyp="http://schemas.microsoft.com/office/drawing/2018/hyperlinkcolor" showMasterPhAnim="0" showMasterSp="0">
+  <p:cSld>
+    <p:spTree>
+      <p:nvGrpSpPr>
+        <p:cNvPr id="140" name="Shape 140"/>
+        <p:cNvGrpSpPr/>
+        <p:nvPr/>
+      </p:nvGrpSpPr>
+      <p:grpSpPr>
+        <a:xfrm>
+          <a:off x="0" y="0"/>
+          <a:ext cx="0" cy="0"/>
+          <a:chOff x="0" y="0"/>
+          <a:chExt cx="0" cy="0"/>
+        </a:xfrm>
+      </p:grpSpPr>
+      <p:sp>
+        <p:nvSpPr>
+          <p:cNvPr id="141" name="Google Shape;141;g35530506554_0_35:notes"/>
+          <p:cNvSpPr/>
+          <p:nvPr>
+            <p:ph idx="2" type="sldImg"/>
+          </p:nvPr>
+        </p:nvSpPr>
+        <p:spPr>
+          <a:xfrm>
+            <a:off x="381300" y="685800"/>
+            <a:ext cx="6096000" cy="3429000"/>
+          </a:xfrm>
+          <a:custGeom>
+            <a:rect b="b" l="l" r="r" t="t"/>
+            <a:pathLst>
+              <a:path extrusionOk="0" h="120000" w="120000">
+                <a:moveTo>
+                  <a:pt x="0" y="0"/>
+                </a:moveTo>
+                <a:lnTo>
+                  <a:pt x="120000" y="0"/>
+                </a:lnTo>
+                <a:lnTo>
+                  <a:pt x="120000" y="120000"/>
+                </a:lnTo>
+                <a:lnTo>
+                  <a:pt x="0" y="120000"/>
+                </a:lnTo>
+                <a:close/>
+              </a:path>
+            </a:pathLst>
+          </a:custGeom>
+        </p:spPr>
+      </p:sp>
+      <p:sp>
+        <p:nvSpPr>
+          <p:cNvPr id="142" name="Google Shape;142;g35530506554_0_35:notes"/>
+          <p:cNvSpPr txBox="1"/>
+          <p:nvPr>
+            <p:ph idx="1" type="body"/>
+          </p:nvPr>
+        </p:nvSpPr>
+        <p:spPr>
+          <a:xfrm>
+            <a:off x="685800" y="4343400"/>
+            <a:ext cx="5486400" cy="4114800"/>
+          </a:xfrm>
+          <a:prstGeom prst="rect">
+            <a:avLst/>
+          </a:prstGeom>
+        </p:spPr>
+        <p:txBody>
+          <a:bodyPr anchorCtr="0" anchor="t" bIns="91425" lIns="91425" spcFirstLastPara="1" rIns="91425" wrap="square" tIns="91425">
+            <a:noAutofit/>
+          </a:bodyPr>
+          <a:lstStyle/>
+          <a:p>
+            <a:pPr indent="0" lvl="0" marL="0" rtl="0" algn="l">
+              <a:spcBef>
+                <a:spcPts val="0"/>
+              </a:spcBef>
+              <a:spcAft>
+                <a:spcPts val="0"/>
+              </a:spcAft>
+              <a:buNone/>
+            </a:pPr>
+            <a:r>
+              <a:t/>
+            </a:r>
+            <a:endParaRPr/>
+          </a:p>
+        </p:txBody>
+      </p:sp>
+    </p:spTree>
+  </p:cSld>
+  <p:clrMapOvr>
+    <a:masterClrMapping/>
+  </p:clrMapOvr>
+</p:notes>
+</file>
+
+<file path=ppt/notesSlides/notesSlide2.xml><?xml version="1.0" encoding="utf-8"?>
+<p:notes xmlns:a="http://schemas.openxmlformats.org/drawingml/2006/main" xmlns:r="http://schemas.openxmlformats.org/officeDocument/2006/relationships" xmlns:mc="http://schemas.openxmlformats.org/markup-compatibility/2006" xmlns:mv="urn:schemas-microsoft-com:mac:vml" xmlns:p="http://schemas.openxmlformats.org/presentationml/2006/main" xmlns:c="http://schemas.openxmlformats.org/drawingml/2006/chart" xmlns:dgm="http://schemas.openxmlformats.org/drawingml/2006/diagram" xmlns:o="urn:schemas-microsoft-com:office:office" xmlns:v="urn:schemas-microsoft-com:vml" xmlns:pvml="urn:schemas-microsoft-com:office:powerpoint" xmlns:com="http://schemas.openxmlformats.org/drawingml/2006/compatibility" xmlns:p14="http://schemas.microsoft.com/office/powerpoint/2010/main" xmlns:p15="http://schemas.microsoft.com/office/powerpoint/2012/main" xmlns:ahyp="http://schemas.microsoft.com/office/drawing/2018/hyperlinkcolor" showMasterPhAnim="0" showMasterSp="0">
+  <p:cSld>
+    <p:spTree>
+      <p:nvGrpSpPr>
+        <p:cNvPr id="56" name="Shape 56"/>
+        <p:cNvGrpSpPr/>
+        <p:nvPr/>
+      </p:nvGrpSpPr>
+      <p:grpSpPr>
+        <a:xfrm>
+          <a:off x="0" y="0"/>
+          <a:ext cx="0" cy="0"/>
+          <a:chOff x="0" y="0"/>
+          <a:chExt cx="0" cy="0"/>
+        </a:xfrm>
+      </p:grpSpPr>
+      <p:sp>
+        <p:nvSpPr>
+          <p:cNvPr id="57" name="Google Shape;57;g355374deb38_1_0:notes"/>
+          <p:cNvSpPr/>
+          <p:nvPr>
+            <p:ph idx="2" type="sldImg"/>
+          </p:nvPr>
+        </p:nvSpPr>
+        <p:spPr>
+          <a:xfrm>
+            <a:off x="381300" y="685800"/>
+            <a:ext cx="6096000" cy="3429000"/>
+          </a:xfrm>
+          <a:custGeom>
+            <a:rect b="b" l="l" r="r" t="t"/>
+            <a:pathLst>
+              <a:path extrusionOk="0" h="120000" w="120000">
+                <a:moveTo>
+                  <a:pt x="0" y="0"/>
+                </a:moveTo>
+                <a:lnTo>
+                  <a:pt x="120000" y="0"/>
+                </a:lnTo>
+                <a:lnTo>
+                  <a:pt x="120000" y="120000"/>
+                </a:lnTo>
+                <a:lnTo>
+                  <a:pt x="0" y="120000"/>
+                </a:lnTo>
+                <a:close/>
+              </a:path>
+            </a:pathLst>
+          </a:custGeom>
+        </p:spPr>
+      </p:sp>
+      <p:sp>
+        <p:nvSpPr>
+          <p:cNvPr id="58" name="Google Shape;58;g355374deb38_1_0:notes"/>
+          <p:cNvSpPr txBox="1"/>
+          <p:nvPr>
+            <p:ph idx="1" type="body"/>
+          </p:nvPr>
+        </p:nvSpPr>
+        <p:spPr>
+          <a:xfrm>
+            <a:off x="685800" y="4343400"/>
+            <a:ext cx="5486400" cy="4114800"/>
+          </a:xfrm>
+          <a:prstGeom prst="rect">
+            <a:avLst/>
+          </a:prstGeom>
+        </p:spPr>
+        <p:txBody>
+          <a:bodyPr anchorCtr="0" anchor="t" bIns="91425" lIns="91425" spcFirstLastPara="1" rIns="91425" wrap="square" tIns="91425">
+            <a:noAutofit/>
+          </a:bodyPr>
+          <a:lstStyle/>
+          <a:p>
+            <a:pPr indent="0" lvl="0" marL="0" rtl="0" algn="l">
+              <a:spcBef>
+                <a:spcPts val="0"/>
+              </a:spcBef>
+              <a:spcAft>
+                <a:spcPts val="0"/>
+              </a:spcAft>
+              <a:buNone/>
+            </a:pPr>
+            <a:r>
+              <a:t/>
+            </a:r>
+            <a:endParaRPr/>
+          </a:p>
+        </p:txBody>
+      </p:sp>
+    </p:spTree>
+  </p:cSld>
+  <p:clrMapOvr>
+    <a:masterClrMapping/>
+  </p:clrMapOvr>
+</p:notes>
+</file>
+
+<file path=ppt/notesSlides/notesSlide3.xml><?xml version="1.0" encoding="utf-8"?>
+<p:notes xmlns:a="http://schemas.openxmlformats.org/drawingml/2006/main" xmlns:r="http://schemas.openxmlformats.org/officeDocument/2006/relationships" xmlns:mc="http://schemas.openxmlformats.org/markup-compatibility/2006" xmlns:mv="urn:schemas-microsoft-com:mac:vml" xmlns:p="http://schemas.openxmlformats.org/presentationml/2006/main" xmlns:c="http://schemas.openxmlformats.org/drawingml/2006/chart" xmlns:dgm="http://schemas.openxmlformats.org/drawingml/2006/diagram" xmlns:o="urn:schemas-microsoft-com:office:office" xmlns:v="urn:schemas-microsoft-com:vml" xmlns:pvml="urn:schemas-microsoft-com:office:powerpoint" xmlns:com="http://schemas.openxmlformats.org/drawingml/2006/compatibility" xmlns:p14="http://schemas.microsoft.com/office/powerpoint/2010/main" xmlns:p15="http://schemas.microsoft.com/office/powerpoint/2012/main" xmlns:ahyp="http://schemas.microsoft.com/office/drawing/2018/hyperlinkcolor" showMasterPhAnim="0" showMasterSp="0">
+  <p:cSld>
+    <p:spTree>
+      <p:nvGrpSpPr>
+        <p:cNvPr id="62" name="Shape 62"/>
+        <p:cNvGrpSpPr/>
+        <p:nvPr/>
+      </p:nvGrpSpPr>
+      <p:grpSpPr>
+        <a:xfrm>
+          <a:off x="0" y="0"/>
+          <a:ext cx="0" cy="0"/>
+          <a:chOff x="0" y="0"/>
+          <a:chExt cx="0" cy="0"/>
+        </a:xfrm>
+      </p:grpSpPr>
+      <p:sp>
+        <p:nvSpPr>
+          <p:cNvPr id="63" name="Google Shape;63;g355374deb38_1_5:notes"/>
+          <p:cNvSpPr/>
+          <p:nvPr>
+            <p:ph idx="2" type="sldImg"/>
+          </p:nvPr>
+        </p:nvSpPr>
+        <p:spPr>
+          <a:xfrm>
+            <a:off x="381300" y="685800"/>
+            <a:ext cx="6096000" cy="3429000"/>
+          </a:xfrm>
+          <a:custGeom>
+            <a:rect b="b" l="l" r="r" t="t"/>
+            <a:pathLst>
+              <a:path extrusionOk="0" h="120000" w="120000">
+                <a:moveTo>
+                  <a:pt x="0" y="0"/>
+                </a:moveTo>
+                <a:lnTo>
+                  <a:pt x="120000" y="0"/>
+                </a:lnTo>
+                <a:lnTo>
+                  <a:pt x="120000" y="120000"/>
+                </a:lnTo>
+                <a:lnTo>
+                  <a:pt x="0" y="120000"/>
+                </a:lnTo>
+                <a:close/>
+              </a:path>
+            </a:pathLst>
+          </a:custGeom>
+        </p:spPr>
+      </p:sp>
+      <p:sp>
+        <p:nvSpPr>
+          <p:cNvPr id="64" name="Google Shape;64;g355374deb38_1_5:notes"/>
+          <p:cNvSpPr txBox="1"/>
+          <p:nvPr>
+            <p:ph idx="1" type="body"/>
+          </p:nvPr>
+        </p:nvSpPr>
+        <p:spPr>
+          <a:xfrm>
+            <a:off x="685800" y="4343400"/>
+            <a:ext cx="5486400" cy="4114800"/>
+          </a:xfrm>
+          <a:prstGeom prst="rect">
+            <a:avLst/>
+          </a:prstGeom>
+        </p:spPr>
+        <p:txBody>
+          <a:bodyPr anchorCtr="0" anchor="t" bIns="91425" lIns="91425" spcFirstLastPara="1" rIns="91425" wrap="square" tIns="91425">
+            <a:noAutofit/>
+          </a:bodyPr>
+          <a:lstStyle/>
+          <a:p>
+            <a:pPr indent="0" lvl="0" marL="0" rtl="0" algn="l">
+              <a:spcBef>
+                <a:spcPts val="0"/>
+              </a:spcBef>
+              <a:spcAft>
+                <a:spcPts val="0"/>
+              </a:spcAft>
+              <a:buNone/>
+            </a:pPr>
+            <a:r>
+              <a:t/>
+            </a:r>
+            <a:endParaRPr/>
+          </a:p>
+        </p:txBody>
+      </p:sp>
+    </p:spTree>
+  </p:cSld>
+  <p:clrMapOvr>
+    <a:masterClrMapping/>
+  </p:clrMapOvr>
+</p:notes>
+</file>
+
+<file path=ppt/notesSlides/notesSlide4.xml><?xml version="1.0" encoding="utf-8"?>
+<p:notes xmlns:a="http://schemas.openxmlformats.org/drawingml/2006/main" xmlns:r="http://schemas.openxmlformats.org/officeDocument/2006/relationships" xmlns:mc="http://schemas.openxmlformats.org/markup-compatibility/2006" xmlns:mv="urn:schemas-microsoft-com:mac:vml" xmlns:p="http://schemas.openxmlformats.org/presentationml/2006/main" xmlns:c="http://schemas.openxmlformats.org/drawingml/2006/chart" xmlns:dgm="http://schemas.openxmlformats.org/drawingml/2006/diagram" xmlns:o="urn:schemas-microsoft-com:office:office" xmlns:v="urn:schemas-microsoft-com:vml" xmlns:pvml="urn:schemas-microsoft-com:office:powerpoint" xmlns:com="http://schemas.openxmlformats.org/drawingml/2006/compatibility" xmlns:p14="http://schemas.microsoft.com/office/powerpoint/2010/main" xmlns:p15="http://schemas.microsoft.com/office/powerpoint/2012/main" xmlns:ahyp="http://schemas.microsoft.com/office/drawing/2018/hyperlinkcolor" showMasterPhAnim="0" showMasterSp="0">
+  <p:cSld>
+    <p:spTree>
+      <p:nvGrpSpPr>
+        <p:cNvPr id="68" name="Shape 68"/>
+        <p:cNvGrpSpPr/>
+        <p:nvPr/>
+      </p:nvGrpSpPr>
+      <p:grpSpPr>
+        <a:xfrm>
+          <a:off x="0" y="0"/>
+          <a:ext cx="0" cy="0"/>
+          <a:chOff x="0" y="0"/>
+          <a:chExt cx="0" cy="0"/>
+        </a:xfrm>
+      </p:grpSpPr>
+      <p:sp>
+        <p:nvSpPr>
+          <p:cNvPr id="69" name="Google Shape;69;g35530506554_0_0:notes"/>
+          <p:cNvSpPr/>
+          <p:nvPr>
+            <p:ph idx="2" type="sldImg"/>
+          </p:nvPr>
+        </p:nvSpPr>
+        <p:spPr>
+          <a:xfrm>
+            <a:off x="381300" y="685800"/>
+            <a:ext cx="6096000" cy="3429000"/>
+          </a:xfrm>
+          <a:custGeom>
+            <a:rect b="b" l="l" r="r" t="t"/>
+            <a:pathLst>
+              <a:path extrusionOk="0" h="120000" w="120000">
+                <a:moveTo>
+                  <a:pt x="0" y="0"/>
+                </a:moveTo>
+                <a:lnTo>
+                  <a:pt x="120000" y="0"/>
+                </a:lnTo>
+                <a:lnTo>
+                  <a:pt x="120000" y="120000"/>
+                </a:lnTo>
+                <a:lnTo>
+                  <a:pt x="0" y="120000"/>
+                </a:lnTo>
+                <a:close/>
+              </a:path>
+            </a:pathLst>
+          </a:custGeom>
+        </p:spPr>
+      </p:sp>
+      <p:sp>
+        <p:nvSpPr>
+          <p:cNvPr id="70" name="Google Shape;70;g35530506554_0_0:notes"/>
+          <p:cNvSpPr txBox="1"/>
+          <p:nvPr>
+            <p:ph idx="1" type="body"/>
+          </p:nvPr>
+        </p:nvSpPr>
+        <p:spPr>
+          <a:xfrm>
+            <a:off x="685800" y="4343400"/>
+            <a:ext cx="5486400" cy="4114800"/>
+          </a:xfrm>
+          <a:prstGeom prst="rect">
+            <a:avLst/>
+          </a:prstGeom>
+        </p:spPr>
+        <p:txBody>
+          <a:bodyPr anchorCtr="0" anchor="t" bIns="91425" lIns="91425" spcFirstLastPara="1" rIns="91425" wrap="square" tIns="91425">
+            <a:noAutofit/>
+          </a:bodyPr>
+          <a:lstStyle/>
+          <a:p>
+            <a:pPr indent="0" lvl="0" marL="0" rtl="0" algn="l">
+              <a:spcBef>
+                <a:spcPts val="0"/>
+              </a:spcBef>
+              <a:spcAft>
+                <a:spcPts val="0"/>
+              </a:spcAft>
+              <a:buNone/>
+            </a:pPr>
+            <a:r>
+              <a:t/>
+            </a:r>
+            <a:endParaRPr/>
+          </a:p>
+        </p:txBody>
+      </p:sp>
+    </p:spTree>
+  </p:cSld>
+  <p:clrMapOvr>
+    <a:masterClrMapping/>
+  </p:clrMapOvr>
+</p:notes>
+</file>
+
+<file path=ppt/notesSlides/notesSlide5.xml><?xml version="1.0" encoding="utf-8"?>
+<p:notes xmlns:a="http://schemas.openxmlformats.org/drawingml/2006/main" xmlns:r="http://schemas.openxmlformats.org/officeDocument/2006/relationships" xmlns:mc="http://schemas.openxmlformats.org/markup-compatibility/2006" xmlns:mv="urn:schemas-microsoft-com:mac:vml" xmlns:p="http://schemas.openxmlformats.org/presentationml/2006/main" xmlns:c="http://schemas.openxmlformats.org/drawingml/2006/chart" xmlns:dgm="http://schemas.openxmlformats.org/drawingml/2006/diagram" xmlns:o="urn:schemas-microsoft-com:office:office" xmlns:v="urn:schemas-microsoft-com:vml" xmlns:pvml="urn:schemas-microsoft-com:office:powerpoint" xmlns:com="http://schemas.openxmlformats.org/drawingml/2006/compatibility" xmlns:p14="http://schemas.microsoft.com/office/powerpoint/2010/main" xmlns:p15="http://schemas.microsoft.com/office/powerpoint/2012/main" xmlns:ahyp="http://schemas.microsoft.com/office/drawing/2018/hyperlinkcolor" showMasterPhAnim="0" showMasterSp="0">
+  <p:cSld>
+    <p:spTree>
+      <p:nvGrpSpPr>
+        <p:cNvPr id="74" name="Shape 74"/>
+        <p:cNvGrpSpPr/>
+        <p:nvPr/>
+      </p:nvGrpSpPr>
+      <p:grpSpPr>
+        <a:xfrm>
+          <a:off x="0" y="0"/>
+          <a:ext cx="0" cy="0"/>
+          <a:chOff x="0" y="0"/>
+          <a:chExt cx="0" cy="0"/>
+        </a:xfrm>
+      </p:grpSpPr>
+      <p:sp>
+        <p:nvSpPr>
+          <p:cNvPr id="75" name="Google Shape;75;g35530506554_0_40:notes"/>
+          <p:cNvSpPr/>
+          <p:nvPr>
+            <p:ph idx="2" type="sldImg"/>
+          </p:nvPr>
+        </p:nvSpPr>
+        <p:spPr>
+          <a:xfrm>
+            <a:off x="381300" y="685800"/>
+            <a:ext cx="6096000" cy="3429000"/>
+          </a:xfrm>
+          <a:custGeom>
+            <a:rect b="b" l="l" r="r" t="t"/>
+            <a:pathLst>
+              <a:path extrusionOk="0" h="120000" w="120000">
+                <a:moveTo>
+                  <a:pt x="0" y="0"/>
+                </a:moveTo>
+                <a:lnTo>
+                  <a:pt x="120000" y="0"/>
+                </a:lnTo>
+                <a:lnTo>
+                  <a:pt x="120000" y="120000"/>
+                </a:lnTo>
+                <a:lnTo>
+                  <a:pt x="0" y="120000"/>
+                </a:lnTo>
+                <a:close/>
+              </a:path>
+            </a:pathLst>
+          </a:custGeom>
+        </p:spPr>
+      </p:sp>
+      <p:sp>
+        <p:nvSpPr>
+          <p:cNvPr id="76" name="Google Shape;76;g35530506554_0_40:notes"/>
+          <p:cNvSpPr txBox="1"/>
+          <p:nvPr>
+            <p:ph idx="1" type="body"/>
+          </p:nvPr>
+        </p:nvSpPr>
+        <p:spPr>
+          <a:xfrm>
+            <a:off x="685800" y="4343400"/>
+            <a:ext cx="5486400" cy="4114800"/>
+          </a:xfrm>
+          <a:prstGeom prst="rect">
+            <a:avLst/>
+          </a:prstGeom>
+        </p:spPr>
+        <p:txBody>
+          <a:bodyPr anchorCtr="0" anchor="t" bIns="91425" lIns="91425" spcFirstLastPara="1" rIns="91425" wrap="square" tIns="91425">
+            <a:noAutofit/>
+          </a:bodyPr>
+          <a:lstStyle/>
+          <a:p>
+            <a:pPr indent="0" lvl="0" marL="0" rtl="0" algn="l">
+              <a:spcBef>
+                <a:spcPts val="0"/>
+              </a:spcBef>
+              <a:spcAft>
+                <a:spcPts val="0"/>
+              </a:spcAft>
+              <a:buNone/>
+            </a:pPr>
+            <a:r>
+              <a:t/>
+            </a:r>
+            <a:endParaRPr/>
+          </a:p>
+        </p:txBody>
+      </p:sp>
+    </p:spTree>
+  </p:cSld>
+  <p:clrMapOvr>
+    <a:masterClrMapping/>
+  </p:clrMapOvr>
+</p:notes>
+</file>
+
+<file path=ppt/notesSlides/notesSlide6.xml><?xml version="1.0" encoding="utf-8"?>
+<p:notes xmlns:a="http://schemas.openxmlformats.org/drawingml/2006/main" xmlns:r="http://schemas.openxmlformats.org/officeDocument/2006/relationships" xmlns:mc="http://schemas.openxmlformats.org/markup-compatibility/2006" xmlns:mv="urn:schemas-microsoft-com:mac:vml" xmlns:p="http://schemas.openxmlformats.org/presentationml/2006/main" xmlns:c="http://schemas.openxmlformats.org/drawingml/2006/chart" xmlns:dgm="http://schemas.openxmlformats.org/drawingml/2006/diagram" xmlns:o="urn:schemas-microsoft-com:office:office" xmlns:v="urn:schemas-microsoft-com:vml" xmlns:pvml="urn:schemas-microsoft-com:office:powerpoint" xmlns:com="http://schemas.openxmlformats.org/drawingml/2006/compatibility" xmlns:p14="http://schemas.microsoft.com/office/powerpoint/2010/main" xmlns:p15="http://schemas.microsoft.com/office/powerpoint/2012/main" xmlns:ahyp="http://schemas.microsoft.com/office/drawing/2018/hyperlinkcolor" showMasterPhAnim="0" showMasterSp="0">
+  <p:cSld>
+    <p:spTree>
+      <p:nvGrpSpPr>
+        <p:cNvPr id="80" name="Shape 80"/>
+        <p:cNvGrpSpPr/>
+        <p:nvPr/>
+      </p:nvGrpSpPr>
+      <p:grpSpPr>
+        <a:xfrm>
+          <a:off x="0" y="0"/>
+          <a:ext cx="0" cy="0"/>
+          <a:chOff x="0" y="0"/>
+          <a:chExt cx="0" cy="0"/>
+        </a:xfrm>
+      </p:grpSpPr>
+      <p:sp>
+        <p:nvSpPr>
+          <p:cNvPr id="81" name="Google Shape;81;g35530506554_0_5:notes"/>
+          <p:cNvSpPr/>
+          <p:nvPr>
+            <p:ph idx="2" type="sldImg"/>
+          </p:nvPr>
+        </p:nvSpPr>
+        <p:spPr>
+          <a:xfrm>
+            <a:off x="381300" y="685800"/>
+            <a:ext cx="6096000" cy="3429000"/>
+          </a:xfrm>
+          <a:custGeom>
+            <a:rect b="b" l="l" r="r" t="t"/>
+            <a:pathLst>
+              <a:path extrusionOk="0" h="120000" w="120000">
+                <a:moveTo>
+                  <a:pt x="0" y="0"/>
+                </a:moveTo>
+                <a:lnTo>
+                  <a:pt x="120000" y="0"/>
+                </a:lnTo>
+                <a:lnTo>
+                  <a:pt x="120000" y="120000"/>
+                </a:lnTo>
+                <a:lnTo>
+                  <a:pt x="0" y="120000"/>
+                </a:lnTo>
+                <a:close/>
+              </a:path>
+            </a:pathLst>
+          </a:custGeom>
+        </p:spPr>
+      </p:sp>
+      <p:sp>
+        <p:nvSpPr>
+          <p:cNvPr id="82" name="Google Shape;82;g35530506554_0_5:notes"/>
+          <p:cNvSpPr txBox="1"/>
+          <p:nvPr>
+            <p:ph idx="1" type="body"/>
+          </p:nvPr>
+        </p:nvSpPr>
+        <p:spPr>
+          <a:xfrm>
+            <a:off x="685800" y="4343400"/>
+            <a:ext cx="5486400" cy="4114800"/>
+          </a:xfrm>
+          <a:prstGeom prst="rect">
+            <a:avLst/>
+          </a:prstGeom>
+        </p:spPr>
+        <p:txBody>
+          <a:bodyPr anchorCtr="0" anchor="t" bIns="91425" lIns="91425" spcFirstLastPara="1" rIns="91425" wrap="square" tIns="91425">
+            <a:noAutofit/>
+          </a:bodyPr>
+          <a:lstStyle/>
+          <a:p>
+            <a:pPr indent="0" lvl="0" marL="0" rtl="0" algn="l">
+              <a:spcBef>
+                <a:spcPts val="0"/>
+              </a:spcBef>
+              <a:spcAft>
+                <a:spcPts val="0"/>
+              </a:spcAft>
+              <a:buNone/>
+            </a:pPr>
+            <a:r>
+              <a:t/>
+            </a:r>
+            <a:endParaRPr/>
+          </a:p>
+        </p:txBody>
+      </p:sp>
+    </p:spTree>
+  </p:cSld>
+  <p:clrMapOvr>
+    <a:masterClrMapping/>
+  </p:clrMapOvr>
+</p:notes>
+</file>
+
+<file path=ppt/notesSlides/notesSlide7.xml><?xml version="1.0" encoding="utf-8"?>
+<p:notes xmlns:a="http://schemas.openxmlformats.org/drawingml/2006/main" xmlns:r="http://schemas.openxmlformats.org/officeDocument/2006/relationships" xmlns:mc="http://schemas.openxmlformats.org/markup-compatibility/2006" xmlns:mv="urn:schemas-microsoft-com:mac:vml" xmlns:p="http://schemas.openxmlformats.org/presentationml/2006/main" xmlns:c="http://schemas.openxmlformats.org/drawingml/2006/chart" xmlns:dgm="http://schemas.openxmlformats.org/drawingml/2006/diagram" xmlns:o="urn:schemas-microsoft-com:office:office" xmlns:v="urn:schemas-microsoft-com:vml" xmlns:pvml="urn:schemas-microsoft-com:office:powerpoint" xmlns:com="http://schemas.openxmlformats.org/drawingml/2006/compatibility" xmlns:p14="http://schemas.microsoft.com/office/powerpoint/2010/main" xmlns:p15="http://schemas.microsoft.com/office/powerpoint/2012/main" xmlns:ahyp="http://schemas.microsoft.com/office/drawing/2018/hyperlinkcolor" showMasterPhAnim="0" showMasterSp="0">
+  <p:cSld>
+    <p:spTree>
+      <p:nvGrpSpPr>
+        <p:cNvPr id="86" name="Shape 86"/>
+        <p:cNvGrpSpPr/>
+        <p:nvPr/>
+      </p:nvGrpSpPr>
+      <p:grpSpPr>
+        <a:xfrm>
+          <a:off x="0" y="0"/>
+          <a:ext cx="0" cy="0"/>
+          <a:chOff x="0" y="0"/>
+          <a:chExt cx="0" cy="0"/>
+        </a:xfrm>
+      </p:grpSpPr>
+      <p:sp>
+        <p:nvSpPr>
+          <p:cNvPr id="87" name="Google Shape;87;g35530506554_0_45:notes"/>
+          <p:cNvSpPr/>
+          <p:nvPr>
+            <p:ph idx="2" type="sldImg"/>
+          </p:nvPr>
+        </p:nvSpPr>
+        <p:spPr>
+          <a:xfrm>
+            <a:off x="381300" y="685800"/>
+            <a:ext cx="6096000" cy="3429000"/>
+          </a:xfrm>
+          <a:custGeom>
+            <a:rect b="b" l="l" r="r" t="t"/>
+            <a:pathLst>
+              <a:path extrusionOk="0" h="120000" w="120000">
+                <a:moveTo>
+                  <a:pt x="0" y="0"/>
+                </a:moveTo>
+                <a:lnTo>
+                  <a:pt x="120000" y="0"/>
+                </a:lnTo>
+                <a:lnTo>
+                  <a:pt x="120000" y="120000"/>
+                </a:lnTo>
+                <a:lnTo>
+                  <a:pt x="0" y="120000"/>
+                </a:lnTo>
+                <a:close/>
+              </a:path>
+            </a:pathLst>
+          </a:custGeom>
+        </p:spPr>
+      </p:sp>
+      <p:sp>
+        <p:nvSpPr>
+          <p:cNvPr id="88" name="Google Shape;88;g35530506554_0_45:notes"/>
+          <p:cNvSpPr txBox="1"/>
+          <p:nvPr>
+            <p:ph idx="1" type="body"/>
+          </p:nvPr>
+        </p:nvSpPr>
+        <p:spPr>
+          <a:xfrm>
+            <a:off x="685800" y="4343400"/>
+            <a:ext cx="5486400" cy="4114800"/>
+          </a:xfrm>
+          <a:prstGeom prst="rect">
+            <a:avLst/>
+          </a:prstGeom>
+        </p:spPr>
+        <p:txBody>
+          <a:bodyPr anchorCtr="0" anchor="t" bIns="91425" lIns="91425" spcFirstLastPara="1" rIns="91425" wrap="square" tIns="91425">
+            <a:noAutofit/>
+          </a:bodyPr>
+          <a:lstStyle/>
+          <a:p>
+            <a:pPr indent="0" lvl="0" marL="0" rtl="0" algn="l">
+              <a:spcBef>
+                <a:spcPts val="0"/>
+              </a:spcBef>
+              <a:spcAft>
+                <a:spcPts val="0"/>
+              </a:spcAft>
+              <a:buNone/>
+            </a:pPr>
+            <a:r>
+              <a:t/>
+            </a:r>
+            <a:endParaRPr/>
+          </a:p>
+        </p:txBody>
+      </p:sp>
+    </p:spTree>
+  </p:cSld>
+  <p:clrMapOvr>
+    <a:masterClrMapping/>
+  </p:clrMapOvr>
+</p:notes>
+</file>
+
+<file path=ppt/notesSlides/notesSlide8.xml><?xml version="1.0" encoding="utf-8"?>
+<p:notes xmlns:a="http://schemas.openxmlformats.org/drawingml/2006/main" xmlns:r="http://schemas.openxmlformats.org/officeDocument/2006/relationships" xmlns:mc="http://schemas.openxmlformats.org/markup-compatibility/2006" xmlns:mv="urn:schemas-microsoft-com:mac:vml" xmlns:p="http://schemas.openxmlformats.org/presentationml/2006/main" xmlns:c="http://schemas.openxmlformats.org/drawingml/2006/chart" xmlns:dgm="http://schemas.openxmlformats.org/drawingml/2006/diagram" xmlns:o="urn:schemas-microsoft-com:office:office" xmlns:v="urn:schemas-microsoft-com:vml" xmlns:pvml="urn:schemas-microsoft-com:office:powerpoint" xmlns:com="http://schemas.openxmlformats.org/drawingml/2006/compatibility" xmlns:p14="http://schemas.microsoft.com/office/powerpoint/2010/main" xmlns:p15="http://schemas.microsoft.com/office/powerpoint/2012/main" xmlns:ahyp="http://schemas.microsoft.com/office/drawing/2018/hyperlinkcolor" showMasterPhAnim="0" showMasterSp="0">
+  <p:cSld>
+    <p:spTree>
+      <p:nvGrpSpPr>
+        <p:cNvPr id="92" name="Shape 92"/>
+        <p:cNvGrpSpPr/>
+        <p:nvPr/>
+      </p:nvGrpSpPr>
+      <p:grpSpPr>
+        <a:xfrm>
+          <a:off x="0" y="0"/>
+          <a:ext cx="0" cy="0"/>
+          <a:chOff x="0" y="0"/>
+          <a:chExt cx="0" cy="0"/>
+        </a:xfrm>
+      </p:grpSpPr>
+      <p:sp>
+        <p:nvSpPr>
+          <p:cNvPr id="93" name="Google Shape;93;g35530506554_0_10:notes"/>
+          <p:cNvSpPr/>
+          <p:nvPr>
+            <p:ph idx="2" type="sldImg"/>
+          </p:nvPr>
+        </p:nvSpPr>
+        <p:spPr>
+          <a:xfrm>
+            <a:off x="381300" y="685800"/>
+            <a:ext cx="6096000" cy="3429000"/>
+          </a:xfrm>
+          <a:custGeom>
+            <a:rect b="b" l="l" r="r" t="t"/>
+            <a:pathLst>
+              <a:path extrusionOk="0" h="120000" w="120000">
+                <a:moveTo>
+                  <a:pt x="0" y="0"/>
+                </a:moveTo>
+                <a:lnTo>
+                  <a:pt x="120000" y="0"/>
+                </a:lnTo>
+                <a:lnTo>
+                  <a:pt x="120000" y="120000"/>
+                </a:lnTo>
+                <a:lnTo>
+                  <a:pt x="0" y="120000"/>
+                </a:lnTo>
+                <a:close/>
+              </a:path>
+            </a:pathLst>
+          </a:custGeom>
+        </p:spPr>
+      </p:sp>
+      <p:sp>
+        <p:nvSpPr>
+          <p:cNvPr id="94" name="Google Shape;94;g35530506554_0_10:notes"/>
+          <p:cNvSpPr txBox="1"/>
+          <p:nvPr>
+            <p:ph idx="1" type="body"/>
+          </p:nvPr>
+        </p:nvSpPr>
+        <p:spPr>
+          <a:xfrm>
+            <a:off x="685800" y="4343400"/>
+            <a:ext cx="5486400" cy="4114800"/>
+          </a:xfrm>
+          <a:prstGeom prst="rect">
+            <a:avLst/>
+          </a:prstGeom>
+        </p:spPr>
+        <p:txBody>
+          <a:bodyPr anchorCtr="0" anchor="t" bIns="91425" lIns="91425" spcFirstLastPara="1" rIns="91425" wrap="square" tIns="91425">
+            <a:noAutofit/>
+          </a:bodyPr>
+          <a:lstStyle/>
+          <a:p>
+            <a:pPr indent="0" lvl="0" marL="0" rtl="0" algn="l">
+              <a:spcBef>
+                <a:spcPts val="0"/>
+              </a:spcBef>
+              <a:spcAft>
+                <a:spcPts val="0"/>
+              </a:spcAft>
+              <a:buNone/>
+            </a:pPr>
+            <a:r>
+              <a:t/>
+            </a:r>
+            <a:endParaRPr/>
+          </a:p>
+        </p:txBody>
+      </p:sp>
+    </p:spTree>
+  </p:cSld>
+  <p:clrMapOvr>
+    <a:masterClrMapping/>
+  </p:clrMapOvr>
+</p:notes>
+</file>
+
+<file path=ppt/notesSlides/notesSlide9.xml><?xml version="1.0" encoding="utf-8"?>
+<p:notes xmlns:a="http://schemas.openxmlformats.org/drawingml/2006/main" xmlns:r="http://schemas.openxmlformats.org/officeDocument/2006/relationships" xmlns:mc="http://schemas.openxmlformats.org/markup-compatibility/2006" xmlns:mv="urn:schemas-microsoft-com:mac:vml" xmlns:p="http://schemas.openxmlformats.org/presentationml/2006/main" xmlns:c="http://schemas.openxmlformats.org/drawingml/2006/chart" xmlns:dgm="http://schemas.openxmlformats.org/drawingml/2006/diagram" xmlns:o="urn:schemas-microsoft-com:office:office" xmlns:v="urn:schemas-microsoft-com:vml" xmlns:pvml="urn:schemas-microsoft-com:office:powerpoint" xmlns:com="http://schemas.openxmlformats.org/drawingml/2006/compatibility" xmlns:p14="http://schemas.microsoft.com/office/powerpoint/2010/main" xmlns:p15="http://schemas.microsoft.com/office/powerpoint/2012/main" xmlns:ahyp="http://schemas.microsoft.com/office/drawing/2018/hyperlinkcolor" showMasterPhAnim="0" showMasterSp="0">
+  <p:cSld>
+    <p:spTree>
+      <p:nvGrpSpPr>
+        <p:cNvPr id="98" name="Shape 98"/>
+        <p:cNvGrpSpPr/>
+        <p:nvPr/>
+      </p:nvGrpSpPr>
+      <p:grpSpPr>
+        <a:xfrm>
+          <a:off x="0" y="0"/>
+          <a:ext cx="0" cy="0"/>
+          <a:chOff x="0" y="0"/>
+          <a:chExt cx="0" cy="0"/>
+        </a:xfrm>
+      </p:grpSpPr>
+      <p:sp>
+        <p:nvSpPr>
+          <p:cNvPr id="99" name="Google Shape;99;g35530506554_0_50:notes"/>
+          <p:cNvSpPr/>
+          <p:nvPr>
+            <p:ph idx="2" type="sldImg"/>
+          </p:nvPr>
+        </p:nvSpPr>
+        <p:spPr>
+          <a:xfrm>
+            <a:off x="381300" y="685800"/>
+            <a:ext cx="6096000" cy="3429000"/>
+          </a:xfrm>
+          <a:custGeom>
+            <a:rect b="b" l="l" r="r" t="t"/>
+            <a:pathLst>
+              <a:path extrusionOk="0" h="120000" w="120000">
+                <a:moveTo>
+                  <a:pt x="0" y="0"/>
+                </a:moveTo>
+                <a:lnTo>
+                  <a:pt x="120000" y="0"/>
+                </a:lnTo>
+                <a:lnTo>
+                  <a:pt x="120000" y="120000"/>
+                </a:lnTo>
+                <a:lnTo>
+                  <a:pt x="0" y="120000"/>
+                </a:lnTo>
+                <a:close/>
+              </a:path>
+            </a:pathLst>
+          </a:custGeom>
+        </p:spPr>
+      </p:sp>
+      <p:sp>
+        <p:nvSpPr>
+          <p:cNvPr id="100" name="Google Shape;100;g35530506554_0_50:notes"/>
           <p:cNvSpPr txBox="1"/>
           <p:nvPr>
             <p:ph idx="1" type="body"/>
@@ -5539,6 +6939,2583 @@
 </p:sld>
 </file>
 
+<file path=ppt/slides/slide10.xml><?xml version="1.0" encoding="utf-8"?>
+<p:sld xmlns:a="http://schemas.openxmlformats.org/drawingml/2006/main" xmlns:r="http://schemas.openxmlformats.org/officeDocument/2006/relationships" xmlns:mc="http://schemas.openxmlformats.org/markup-compatibility/2006" xmlns:mv="urn:schemas-microsoft-com:mac:vml" xmlns:p="http://schemas.openxmlformats.org/presentationml/2006/main" xmlns:c="http://schemas.openxmlformats.org/drawingml/2006/chart" xmlns:dgm="http://schemas.openxmlformats.org/drawingml/2006/diagram" xmlns:o="urn:schemas-microsoft-com:office:office" xmlns:v="urn:schemas-microsoft-com:vml" xmlns:pvml="urn:schemas-microsoft-com:office:powerpoint" xmlns:com="http://schemas.openxmlformats.org/drawingml/2006/compatibility" xmlns:p14="http://schemas.microsoft.com/office/powerpoint/2010/main" xmlns:p15="http://schemas.microsoft.com/office/powerpoint/2012/main" xmlns:ahyp="http://schemas.microsoft.com/office/drawing/2018/hyperlinkcolor">
+  <p:cSld>
+    <p:spTree>
+      <p:nvGrpSpPr>
+        <p:cNvPr id="107" name="Shape 107"/>
+        <p:cNvGrpSpPr/>
+        <p:nvPr/>
+      </p:nvGrpSpPr>
+      <p:grpSpPr>
+        <a:xfrm>
+          <a:off x="0" y="0"/>
+          <a:ext cx="0" cy="0"/>
+          <a:chOff x="0" y="0"/>
+          <a:chExt cx="0" cy="0"/>
+        </a:xfrm>
+      </p:grpSpPr>
+      <p:sp>
+        <p:nvSpPr>
+          <p:cNvPr id="108" name="Google Shape;108;p22"/>
+          <p:cNvSpPr txBox="1"/>
+          <p:nvPr>
+            <p:ph type="title"/>
+          </p:nvPr>
+        </p:nvSpPr>
+        <p:spPr>
+          <a:xfrm>
+            <a:off x="311700" y="445025"/>
+            <a:ext cx="8520600" cy="572700"/>
+          </a:xfrm>
+          <a:prstGeom prst="rect">
+            <a:avLst/>
+          </a:prstGeom>
+        </p:spPr>
+        <p:txBody>
+          <a:bodyPr anchorCtr="0" anchor="t" bIns="91425" lIns="91425" spcFirstLastPara="1" rIns="91425" wrap="square" tIns="91425">
+            <a:normAutofit fontScale="90000"/>
+          </a:bodyPr>
+          <a:lstStyle/>
+          <a:p>
+            <a:pPr indent="0" lvl="0" marL="0" rtl="0" algn="l">
+              <a:spcBef>
+                <a:spcPts val="0"/>
+              </a:spcBef>
+              <a:spcAft>
+                <a:spcPts val="0"/>
+              </a:spcAft>
+              <a:buNone/>
+            </a:pPr>
+            <a:r>
+              <a:t/>
+            </a:r>
+            <a:endParaRPr/>
+          </a:p>
+        </p:txBody>
+      </p:sp>
+      <p:sp>
+        <p:nvSpPr>
+          <p:cNvPr id="109" name="Google Shape;109;p22"/>
+          <p:cNvSpPr txBox="1"/>
+          <p:nvPr>
+            <p:ph idx="1" type="body"/>
+          </p:nvPr>
+        </p:nvSpPr>
+        <p:spPr>
+          <a:xfrm>
+            <a:off x="311700" y="1152475"/>
+            <a:ext cx="8520600" cy="3416400"/>
+          </a:xfrm>
+          <a:prstGeom prst="rect">
+            <a:avLst/>
+          </a:prstGeom>
+        </p:spPr>
+        <p:txBody>
+          <a:bodyPr anchorCtr="0" anchor="t" bIns="91425" lIns="91425" spcFirstLastPara="1" rIns="91425" wrap="square" tIns="91425">
+            <a:normAutofit/>
+          </a:bodyPr>
+          <a:lstStyle/>
+          <a:p>
+            <a:pPr indent="0" lvl="0" marL="0" rtl="0" algn="l">
+              <a:spcBef>
+                <a:spcPts val="0"/>
+              </a:spcBef>
+              <a:spcAft>
+                <a:spcPts val="1200"/>
+              </a:spcAft>
+              <a:buNone/>
+            </a:pPr>
+            <a:r>
+              <a:t/>
+            </a:r>
+            <a:endParaRPr/>
+          </a:p>
+        </p:txBody>
+      </p:sp>
+    </p:spTree>
+  </p:cSld>
+  <p:clrMapOvr>
+    <a:masterClrMapping/>
+  </p:clrMapOvr>
+</p:sld>
+</file>
+
+<file path=ppt/slides/slide11.xml><?xml version="1.0" encoding="utf-8"?>
+<p:sld xmlns:a="http://schemas.openxmlformats.org/drawingml/2006/main" xmlns:r="http://schemas.openxmlformats.org/officeDocument/2006/relationships" xmlns:mc="http://schemas.openxmlformats.org/markup-compatibility/2006" xmlns:mv="urn:schemas-microsoft-com:mac:vml" xmlns:p="http://schemas.openxmlformats.org/presentationml/2006/main" xmlns:c="http://schemas.openxmlformats.org/drawingml/2006/chart" xmlns:dgm="http://schemas.openxmlformats.org/drawingml/2006/diagram" xmlns:o="urn:schemas-microsoft-com:office:office" xmlns:v="urn:schemas-microsoft-com:vml" xmlns:pvml="urn:schemas-microsoft-com:office:powerpoint" xmlns:com="http://schemas.openxmlformats.org/drawingml/2006/compatibility" xmlns:p14="http://schemas.microsoft.com/office/powerpoint/2010/main" xmlns:p15="http://schemas.microsoft.com/office/powerpoint/2012/main" xmlns:ahyp="http://schemas.microsoft.com/office/drawing/2018/hyperlinkcolor">
+  <p:cSld>
+    <p:spTree>
+      <p:nvGrpSpPr>
+        <p:cNvPr id="113" name="Shape 113"/>
+        <p:cNvGrpSpPr/>
+        <p:nvPr/>
+      </p:nvGrpSpPr>
+      <p:grpSpPr>
+        <a:xfrm>
+          <a:off x="0" y="0"/>
+          <a:ext cx="0" cy="0"/>
+          <a:chOff x="0" y="0"/>
+          <a:chExt cx="0" cy="0"/>
+        </a:xfrm>
+      </p:grpSpPr>
+      <p:sp>
+        <p:nvSpPr>
+          <p:cNvPr id="114" name="Google Shape;114;p23"/>
+          <p:cNvSpPr txBox="1"/>
+          <p:nvPr>
+            <p:ph type="title"/>
+          </p:nvPr>
+        </p:nvSpPr>
+        <p:spPr>
+          <a:xfrm>
+            <a:off x="311700" y="445025"/>
+            <a:ext cx="8520600" cy="572700"/>
+          </a:xfrm>
+          <a:prstGeom prst="rect">
+            <a:avLst/>
+          </a:prstGeom>
+        </p:spPr>
+        <p:txBody>
+          <a:bodyPr anchorCtr="0" anchor="t" bIns="91425" lIns="91425" spcFirstLastPara="1" rIns="91425" wrap="square" tIns="91425">
+            <a:normAutofit fontScale="90000"/>
+          </a:bodyPr>
+          <a:lstStyle/>
+          <a:p>
+            <a:pPr indent="0" lvl="0" marL="0" rtl="0" algn="l">
+              <a:spcBef>
+                <a:spcPts val="0"/>
+              </a:spcBef>
+              <a:spcAft>
+                <a:spcPts val="0"/>
+              </a:spcAft>
+              <a:buNone/>
+            </a:pPr>
+            <a:r>
+              <a:rPr lang="en"/>
+              <a:t>Unit Testing - Zoheb</a:t>
+            </a:r>
+            <a:endParaRPr/>
+          </a:p>
+        </p:txBody>
+      </p:sp>
+      <p:sp>
+        <p:nvSpPr>
+          <p:cNvPr id="115" name="Google Shape;115;p23"/>
+          <p:cNvSpPr txBox="1"/>
+          <p:nvPr>
+            <p:ph idx="1" type="body"/>
+          </p:nvPr>
+        </p:nvSpPr>
+        <p:spPr>
+          <a:xfrm>
+            <a:off x="311700" y="1118625"/>
+            <a:ext cx="5183700" cy="3903000"/>
+          </a:xfrm>
+          <a:prstGeom prst="rect">
+            <a:avLst/>
+          </a:prstGeom>
+        </p:spPr>
+        <p:txBody>
+          <a:bodyPr anchorCtr="0" anchor="t" bIns="91425" lIns="91425" spcFirstLastPara="1" rIns="91425" wrap="square" tIns="91425">
+            <a:noAutofit/>
+          </a:bodyPr>
+          <a:lstStyle/>
+          <a:p>
+            <a:pPr indent="-355600" lvl="0" marL="457200" rtl="0" algn="l">
+              <a:lnSpc>
+                <a:spcPct val="105000"/>
+              </a:lnSpc>
+              <a:spcBef>
+                <a:spcPts val="0"/>
+              </a:spcBef>
+              <a:spcAft>
+                <a:spcPts val="0"/>
+              </a:spcAft>
+              <a:buClr>
+                <a:schemeClr val="dk1"/>
+              </a:buClr>
+              <a:buSzPts val="2000"/>
+              <a:buChar char="●"/>
+            </a:pPr>
+            <a:r>
+              <a:rPr lang="en" sz="2000">
+                <a:solidFill>
+                  <a:schemeClr val="dk1"/>
+                </a:solidFill>
+              </a:rPr>
+              <a:t>Uses JUnit framework for automated test execution.</a:t>
+            </a:r>
+            <a:endParaRPr sz="2000">
+              <a:solidFill>
+                <a:schemeClr val="dk1"/>
+              </a:solidFill>
+            </a:endParaRPr>
+          </a:p>
+          <a:p>
+            <a:pPr indent="0" lvl="0" marL="0" rtl="0" algn="l">
+              <a:lnSpc>
+                <a:spcPct val="105000"/>
+              </a:lnSpc>
+              <a:spcBef>
+                <a:spcPts val="1200"/>
+              </a:spcBef>
+              <a:spcAft>
+                <a:spcPts val="0"/>
+              </a:spcAft>
+              <a:buSzPts val="688"/>
+              <a:buNone/>
+            </a:pPr>
+            <a:r>
+              <a:t/>
+            </a:r>
+            <a:endParaRPr sz="2000">
+              <a:solidFill>
+                <a:schemeClr val="dk1"/>
+              </a:solidFill>
+            </a:endParaRPr>
+          </a:p>
+          <a:p>
+            <a:pPr indent="-355600" lvl="0" marL="457200" rtl="0" algn="l">
+              <a:lnSpc>
+                <a:spcPct val="105000"/>
+              </a:lnSpc>
+              <a:spcBef>
+                <a:spcPts val="1200"/>
+              </a:spcBef>
+              <a:spcAft>
+                <a:spcPts val="0"/>
+              </a:spcAft>
+              <a:buClr>
+                <a:schemeClr val="dk1"/>
+              </a:buClr>
+              <a:buSzPts val="2000"/>
+              <a:buChar char="●"/>
+            </a:pPr>
+            <a:r>
+              <a:rPr lang="en" sz="2000">
+                <a:solidFill>
+                  <a:schemeClr val="dk1"/>
+                </a:solidFill>
+              </a:rPr>
+              <a:t>There exists a testing suite in AllTests.java that acts as a driver for all tests in the system. </a:t>
+            </a:r>
+            <a:endParaRPr sz="2000">
+              <a:solidFill>
+                <a:schemeClr val="dk1"/>
+              </a:solidFill>
+            </a:endParaRPr>
+          </a:p>
+          <a:p>
+            <a:pPr indent="0" lvl="0" marL="0" rtl="0" algn="l">
+              <a:lnSpc>
+                <a:spcPct val="105000"/>
+              </a:lnSpc>
+              <a:spcBef>
+                <a:spcPts val="1200"/>
+              </a:spcBef>
+              <a:spcAft>
+                <a:spcPts val="0"/>
+              </a:spcAft>
+              <a:buSzPts val="688"/>
+              <a:buNone/>
+            </a:pPr>
+            <a:r>
+              <a:t/>
+            </a:r>
+            <a:endParaRPr sz="2000">
+              <a:solidFill>
+                <a:schemeClr val="dk1"/>
+              </a:solidFill>
+            </a:endParaRPr>
+          </a:p>
+          <a:p>
+            <a:pPr indent="-355600" lvl="0" marL="457200" rtl="0" algn="l">
+              <a:lnSpc>
+                <a:spcPct val="105000"/>
+              </a:lnSpc>
+              <a:spcBef>
+                <a:spcPts val="1200"/>
+              </a:spcBef>
+              <a:spcAft>
+                <a:spcPts val="0"/>
+              </a:spcAft>
+              <a:buClr>
+                <a:schemeClr val="dk1"/>
+              </a:buClr>
+              <a:buSzPts val="2000"/>
+              <a:buChar char="●"/>
+            </a:pPr>
+            <a:r>
+              <a:rPr lang="en" sz="2000">
+                <a:solidFill>
+                  <a:schemeClr val="dk1"/>
+                </a:solidFill>
+              </a:rPr>
+              <a:t>Covers normal operations, as well as robust operations.</a:t>
+            </a:r>
+            <a:endParaRPr sz="2000">
+              <a:solidFill>
+                <a:schemeClr val="dk1"/>
+              </a:solidFill>
+            </a:endParaRPr>
+          </a:p>
+          <a:p>
+            <a:pPr indent="0" lvl="0" marL="0" rtl="0" algn="l">
+              <a:lnSpc>
+                <a:spcPct val="105000"/>
+              </a:lnSpc>
+              <a:spcBef>
+                <a:spcPts val="1200"/>
+              </a:spcBef>
+              <a:spcAft>
+                <a:spcPts val="0"/>
+              </a:spcAft>
+              <a:buClr>
+                <a:schemeClr val="dk1"/>
+              </a:buClr>
+              <a:buSzPts val="688"/>
+              <a:buFont typeface="Arial"/>
+              <a:buNone/>
+            </a:pPr>
+            <a:r>
+              <a:t/>
+            </a:r>
+            <a:endParaRPr sz="2000">
+              <a:solidFill>
+                <a:schemeClr val="dk1"/>
+              </a:solidFill>
+            </a:endParaRPr>
+          </a:p>
+          <a:p>
+            <a:pPr indent="0" lvl="0" marL="0" rtl="0" algn="l">
+              <a:lnSpc>
+                <a:spcPct val="105000"/>
+              </a:lnSpc>
+              <a:spcBef>
+                <a:spcPts val="1200"/>
+              </a:spcBef>
+              <a:spcAft>
+                <a:spcPts val="0"/>
+              </a:spcAft>
+              <a:buClr>
+                <a:schemeClr val="dk1"/>
+              </a:buClr>
+              <a:buSzPts val="688"/>
+              <a:buFont typeface="Arial"/>
+              <a:buNone/>
+            </a:pPr>
+            <a:r>
+              <a:t/>
+            </a:r>
+            <a:endParaRPr sz="2000">
+              <a:solidFill>
+                <a:schemeClr val="dk1"/>
+              </a:solidFill>
+            </a:endParaRPr>
+          </a:p>
+          <a:p>
+            <a:pPr indent="0" lvl="0" marL="0" rtl="0" algn="l">
+              <a:lnSpc>
+                <a:spcPct val="105000"/>
+              </a:lnSpc>
+              <a:spcBef>
+                <a:spcPts val="1200"/>
+              </a:spcBef>
+              <a:spcAft>
+                <a:spcPts val="1200"/>
+              </a:spcAft>
+              <a:buSzPts val="688"/>
+              <a:buNone/>
+            </a:pPr>
+            <a:r>
+              <a:t/>
+            </a:r>
+            <a:endParaRPr sz="2000">
+              <a:solidFill>
+                <a:schemeClr val="dk1"/>
+              </a:solidFill>
+            </a:endParaRPr>
+          </a:p>
+        </p:txBody>
+      </p:sp>
+      <p:pic>
+        <p:nvPicPr>
+          <p:cNvPr id="116" name="Google Shape;116;p23"/>
+          <p:cNvPicPr preferRelativeResize="0"/>
+          <p:nvPr/>
+        </p:nvPicPr>
+        <p:blipFill>
+          <a:blip r:embed="rId3">
+            <a:alphaModFix/>
+          </a:blip>
+          <a:stretch>
+            <a:fillRect/>
+          </a:stretch>
+        </p:blipFill>
+        <p:spPr>
+          <a:xfrm>
+            <a:off x="5671425" y="661263"/>
+            <a:ext cx="2875499" cy="3820975"/>
+          </a:xfrm>
+          <a:prstGeom prst="rect">
+            <a:avLst/>
+          </a:prstGeom>
+          <a:noFill/>
+          <a:ln>
+            <a:noFill/>
+          </a:ln>
+        </p:spPr>
+      </p:pic>
+    </p:spTree>
+  </p:cSld>
+  <p:clrMapOvr>
+    <a:masterClrMapping/>
+  </p:clrMapOvr>
+</p:sld>
+</file>
+
+<file path=ppt/slides/slide12.xml><?xml version="1.0" encoding="utf-8"?>
+<p:sld xmlns:a="http://schemas.openxmlformats.org/drawingml/2006/main" xmlns:r="http://schemas.openxmlformats.org/officeDocument/2006/relationships" xmlns:mc="http://schemas.openxmlformats.org/markup-compatibility/2006" xmlns:mv="urn:schemas-microsoft-com:mac:vml" xmlns:p="http://schemas.openxmlformats.org/presentationml/2006/main" xmlns:c="http://schemas.openxmlformats.org/drawingml/2006/chart" xmlns:dgm="http://schemas.openxmlformats.org/drawingml/2006/diagram" xmlns:o="urn:schemas-microsoft-com:office:office" xmlns:v="urn:schemas-microsoft-com:vml" xmlns:pvml="urn:schemas-microsoft-com:office:powerpoint" xmlns:com="http://schemas.openxmlformats.org/drawingml/2006/compatibility" xmlns:p14="http://schemas.microsoft.com/office/powerpoint/2010/main" xmlns:p15="http://schemas.microsoft.com/office/powerpoint/2012/main" xmlns:ahyp="http://schemas.microsoft.com/office/drawing/2018/hyperlinkcolor">
+  <p:cSld>
+    <p:spTree>
+      <p:nvGrpSpPr>
+        <p:cNvPr id="120" name="Shape 120"/>
+        <p:cNvGrpSpPr/>
+        <p:nvPr/>
+      </p:nvGrpSpPr>
+      <p:grpSpPr>
+        <a:xfrm>
+          <a:off x="0" y="0"/>
+          <a:ext cx="0" cy="0"/>
+          <a:chOff x="0" y="0"/>
+          <a:chExt cx="0" cy="0"/>
+        </a:xfrm>
+      </p:grpSpPr>
+      <p:sp>
+        <p:nvSpPr>
+          <p:cNvPr id="121" name="Google Shape;121;p24"/>
+          <p:cNvSpPr txBox="1"/>
+          <p:nvPr>
+            <p:ph type="title"/>
+          </p:nvPr>
+        </p:nvSpPr>
+        <p:spPr>
+          <a:xfrm>
+            <a:off x="311700" y="445025"/>
+            <a:ext cx="8520600" cy="572700"/>
+          </a:xfrm>
+          <a:prstGeom prst="rect">
+            <a:avLst/>
+          </a:prstGeom>
+        </p:spPr>
+        <p:txBody>
+          <a:bodyPr anchorCtr="0" anchor="t" bIns="91425" lIns="91425" spcFirstLastPara="1" rIns="91425" wrap="square" tIns="91425">
+            <a:normAutofit fontScale="90000"/>
+          </a:bodyPr>
+          <a:lstStyle/>
+          <a:p>
+            <a:pPr indent="0" lvl="0" marL="0" rtl="0" algn="l">
+              <a:spcBef>
+                <a:spcPts val="0"/>
+              </a:spcBef>
+              <a:spcAft>
+                <a:spcPts val="0"/>
+              </a:spcAft>
+              <a:buNone/>
+            </a:pPr>
+            <a:r>
+              <a:rPr lang="en"/>
+              <a:t>Unit Testing - Zoheb</a:t>
+            </a:r>
+            <a:endParaRPr/>
+          </a:p>
+        </p:txBody>
+      </p:sp>
+      <p:sp>
+        <p:nvSpPr>
+          <p:cNvPr id="122" name="Google Shape;122;p24"/>
+          <p:cNvSpPr txBox="1"/>
+          <p:nvPr>
+            <p:ph idx="1" type="body"/>
+          </p:nvPr>
+        </p:nvSpPr>
+        <p:spPr>
+          <a:xfrm>
+            <a:off x="311700" y="1118625"/>
+            <a:ext cx="8520600" cy="722100"/>
+          </a:xfrm>
+          <a:prstGeom prst="rect">
+            <a:avLst/>
+          </a:prstGeom>
+        </p:spPr>
+        <p:txBody>
+          <a:bodyPr anchorCtr="0" anchor="t" bIns="91425" lIns="91425" spcFirstLastPara="1" rIns="91425" wrap="square" tIns="91425">
+            <a:normAutofit/>
+          </a:bodyPr>
+          <a:lstStyle/>
+          <a:p>
+            <a:pPr indent="0" lvl="0" marL="0" rtl="0" algn="l">
+              <a:spcBef>
+                <a:spcPts val="0"/>
+              </a:spcBef>
+              <a:spcAft>
+                <a:spcPts val="1200"/>
+              </a:spcAft>
+              <a:buNone/>
+            </a:pPr>
+            <a:r>
+              <a:rPr lang="en" sz="2400">
+                <a:solidFill>
+                  <a:schemeClr val="dk1"/>
+                </a:solidFill>
+              </a:rPr>
+              <a:t>Performed extensive Unit Testing for the following classes:</a:t>
+            </a:r>
+            <a:endParaRPr sz="2400">
+              <a:solidFill>
+                <a:schemeClr val="dk1"/>
+              </a:solidFill>
+            </a:endParaRPr>
+          </a:p>
+        </p:txBody>
+      </p:sp>
+      <p:sp>
+        <p:nvSpPr>
+          <p:cNvPr id="123" name="Google Shape;123;p24"/>
+          <p:cNvSpPr txBox="1"/>
+          <p:nvPr/>
+        </p:nvSpPr>
+        <p:spPr>
+          <a:xfrm>
+            <a:off x="527875" y="1847600"/>
+            <a:ext cx="2402700" cy="2407200"/>
+          </a:xfrm>
+          <a:prstGeom prst="rect">
+            <a:avLst/>
+          </a:prstGeom>
+          <a:noFill/>
+          <a:ln>
+            <a:noFill/>
+          </a:ln>
+        </p:spPr>
+        <p:txBody>
+          <a:bodyPr anchorCtr="0" anchor="t" bIns="91425" lIns="91425" spcFirstLastPara="1" rIns="91425" wrap="square" tIns="91425">
+            <a:spAutoFit/>
+          </a:bodyPr>
+          <a:lstStyle/>
+          <a:p>
+            <a:pPr indent="-381000" lvl="0" marL="457200" rtl="0" algn="l">
+              <a:lnSpc>
+                <a:spcPct val="115000"/>
+              </a:lnSpc>
+              <a:spcBef>
+                <a:spcPts val="0"/>
+              </a:spcBef>
+              <a:spcAft>
+                <a:spcPts val="0"/>
+              </a:spcAft>
+              <a:buClr>
+                <a:schemeClr val="dk1"/>
+              </a:buClr>
+              <a:buSzPts val="2400"/>
+              <a:buChar char="-"/>
+            </a:pPr>
+            <a:r>
+              <a:rPr lang="en" sz="2400">
+                <a:solidFill>
+                  <a:schemeClr val="dk1"/>
+                </a:solidFill>
+              </a:rPr>
+              <a:t>Chat</a:t>
+            </a:r>
+            <a:endParaRPr sz="2400">
+              <a:solidFill>
+                <a:schemeClr val="dk1"/>
+              </a:solidFill>
+            </a:endParaRPr>
+          </a:p>
+          <a:p>
+            <a:pPr indent="-381000" lvl="0" marL="457200" rtl="0" algn="l">
+              <a:lnSpc>
+                <a:spcPct val="115000"/>
+              </a:lnSpc>
+              <a:spcBef>
+                <a:spcPts val="0"/>
+              </a:spcBef>
+              <a:spcAft>
+                <a:spcPts val="0"/>
+              </a:spcAft>
+              <a:buClr>
+                <a:schemeClr val="dk1"/>
+              </a:buClr>
+              <a:buSzPts val="2400"/>
+              <a:buChar char="-"/>
+            </a:pPr>
+            <a:r>
+              <a:rPr lang="en" sz="2400">
+                <a:solidFill>
+                  <a:schemeClr val="dk1"/>
+                </a:solidFill>
+              </a:rPr>
+              <a:t>Client</a:t>
+            </a:r>
+            <a:endParaRPr sz="2400">
+              <a:solidFill>
+                <a:schemeClr val="dk1"/>
+              </a:solidFill>
+            </a:endParaRPr>
+          </a:p>
+          <a:p>
+            <a:pPr indent="-381000" lvl="0" marL="457200" rtl="0" algn="l">
+              <a:lnSpc>
+                <a:spcPct val="115000"/>
+              </a:lnSpc>
+              <a:spcBef>
+                <a:spcPts val="0"/>
+              </a:spcBef>
+              <a:spcAft>
+                <a:spcPts val="0"/>
+              </a:spcAft>
+              <a:buClr>
+                <a:schemeClr val="dk1"/>
+              </a:buClr>
+              <a:buSzPts val="2400"/>
+              <a:buChar char="-"/>
+            </a:pPr>
+            <a:r>
+              <a:rPr lang="en" sz="2400">
+                <a:solidFill>
+                  <a:schemeClr val="dk1"/>
+                </a:solidFill>
+              </a:rPr>
+              <a:t>DBManager</a:t>
+            </a:r>
+            <a:endParaRPr sz="2400">
+              <a:solidFill>
+                <a:schemeClr val="dk1"/>
+              </a:solidFill>
+            </a:endParaRPr>
+          </a:p>
+          <a:p>
+            <a:pPr indent="-381000" lvl="0" marL="457200" rtl="0" algn="l">
+              <a:lnSpc>
+                <a:spcPct val="115000"/>
+              </a:lnSpc>
+              <a:spcBef>
+                <a:spcPts val="0"/>
+              </a:spcBef>
+              <a:spcAft>
+                <a:spcPts val="0"/>
+              </a:spcAft>
+              <a:buClr>
+                <a:schemeClr val="dk1"/>
+              </a:buClr>
+              <a:buSzPts val="2400"/>
+              <a:buChar char="-"/>
+            </a:pPr>
+            <a:r>
+              <a:rPr lang="en" sz="2400">
+                <a:solidFill>
+                  <a:schemeClr val="dk1"/>
+                </a:solidFill>
+              </a:rPr>
+              <a:t>ITAdmin</a:t>
+            </a:r>
+            <a:endParaRPr sz="2400">
+              <a:solidFill>
+                <a:schemeClr val="dk1"/>
+              </a:solidFill>
+            </a:endParaRPr>
+          </a:p>
+          <a:p>
+            <a:pPr indent="0" lvl="0" marL="457200" rtl="0" algn="l">
+              <a:lnSpc>
+                <a:spcPct val="115000"/>
+              </a:lnSpc>
+              <a:spcBef>
+                <a:spcPts val="1200"/>
+              </a:spcBef>
+              <a:spcAft>
+                <a:spcPts val="1200"/>
+              </a:spcAft>
+              <a:buNone/>
+            </a:pPr>
+            <a:r>
+              <a:t/>
+            </a:r>
+            <a:endParaRPr sz="2400">
+              <a:solidFill>
+                <a:schemeClr val="dk1"/>
+              </a:solidFill>
+            </a:endParaRPr>
+          </a:p>
+        </p:txBody>
+      </p:sp>
+      <p:sp>
+        <p:nvSpPr>
+          <p:cNvPr id="124" name="Google Shape;124;p24"/>
+          <p:cNvSpPr txBox="1"/>
+          <p:nvPr/>
+        </p:nvSpPr>
+        <p:spPr>
+          <a:xfrm>
+            <a:off x="3850875" y="1847600"/>
+            <a:ext cx="3898200" cy="1773300"/>
+          </a:xfrm>
+          <a:prstGeom prst="rect">
+            <a:avLst/>
+          </a:prstGeom>
+          <a:noFill/>
+          <a:ln>
+            <a:noFill/>
+          </a:ln>
+        </p:spPr>
+        <p:txBody>
+          <a:bodyPr anchorCtr="0" anchor="t" bIns="91425" lIns="91425" spcFirstLastPara="1" rIns="91425" wrap="square" tIns="91425">
+            <a:spAutoFit/>
+          </a:bodyPr>
+          <a:lstStyle/>
+          <a:p>
+            <a:pPr indent="-381000" lvl="0" marL="457200" rtl="0" algn="l">
+              <a:lnSpc>
+                <a:spcPct val="115000"/>
+              </a:lnSpc>
+              <a:spcBef>
+                <a:spcPts val="0"/>
+              </a:spcBef>
+              <a:spcAft>
+                <a:spcPts val="0"/>
+              </a:spcAft>
+              <a:buClr>
+                <a:schemeClr val="dk1"/>
+              </a:buClr>
+              <a:buSzPts val="2400"/>
+              <a:buChar char="-"/>
+            </a:pPr>
+            <a:r>
+              <a:rPr lang="en" sz="2400">
+                <a:solidFill>
+                  <a:schemeClr val="dk1"/>
+                </a:solidFill>
+              </a:rPr>
+              <a:t>Message</a:t>
+            </a:r>
+            <a:endParaRPr sz="2400">
+              <a:solidFill>
+                <a:schemeClr val="dk1"/>
+              </a:solidFill>
+            </a:endParaRPr>
+          </a:p>
+          <a:p>
+            <a:pPr indent="-381000" lvl="0" marL="457200" rtl="0" algn="l">
+              <a:lnSpc>
+                <a:spcPct val="115000"/>
+              </a:lnSpc>
+              <a:spcBef>
+                <a:spcPts val="0"/>
+              </a:spcBef>
+              <a:spcAft>
+                <a:spcPts val="0"/>
+              </a:spcAft>
+              <a:buClr>
+                <a:schemeClr val="dk1"/>
+              </a:buClr>
+              <a:buSzPts val="2400"/>
+              <a:buChar char="-"/>
+            </a:pPr>
+            <a:r>
+              <a:rPr lang="en" sz="2400">
+                <a:solidFill>
+                  <a:schemeClr val="dk1"/>
+                </a:solidFill>
+              </a:rPr>
+              <a:t>Packet</a:t>
+            </a:r>
+            <a:endParaRPr sz="2400">
+              <a:solidFill>
+                <a:schemeClr val="dk1"/>
+              </a:solidFill>
+            </a:endParaRPr>
+          </a:p>
+          <a:p>
+            <a:pPr indent="-381000" lvl="0" marL="457200" rtl="0" algn="l">
+              <a:spcBef>
+                <a:spcPts val="0"/>
+              </a:spcBef>
+              <a:spcAft>
+                <a:spcPts val="0"/>
+              </a:spcAft>
+              <a:buClr>
+                <a:schemeClr val="dk1"/>
+              </a:buClr>
+              <a:buSzPts val="2400"/>
+              <a:buChar char="-"/>
+            </a:pPr>
+            <a:r>
+              <a:rPr lang="en" sz="2400">
+                <a:solidFill>
+                  <a:schemeClr val="dk1"/>
+                </a:solidFill>
+              </a:rPr>
+              <a:t>Server</a:t>
+            </a:r>
+            <a:endParaRPr sz="2400">
+              <a:solidFill>
+                <a:schemeClr val="dk1"/>
+              </a:solidFill>
+            </a:endParaRPr>
+          </a:p>
+          <a:p>
+            <a:pPr indent="-381000" lvl="0" marL="457200" rtl="0" algn="l">
+              <a:spcBef>
+                <a:spcPts val="0"/>
+              </a:spcBef>
+              <a:spcAft>
+                <a:spcPts val="0"/>
+              </a:spcAft>
+              <a:buClr>
+                <a:schemeClr val="dk1"/>
+              </a:buClr>
+              <a:buSzPts val="2400"/>
+              <a:buChar char="-"/>
+            </a:pPr>
+            <a:r>
+              <a:rPr lang="en" sz="2400">
+                <a:solidFill>
+                  <a:schemeClr val="dk1"/>
+                </a:solidFill>
+              </a:rPr>
+              <a:t>User</a:t>
+            </a:r>
+            <a:endParaRPr sz="2400">
+              <a:solidFill>
+                <a:schemeClr val="dk1"/>
+              </a:solidFill>
+            </a:endParaRPr>
+          </a:p>
+        </p:txBody>
+      </p:sp>
+      <p:sp>
+        <p:nvSpPr>
+          <p:cNvPr id="125" name="Google Shape;125;p24"/>
+          <p:cNvSpPr txBox="1"/>
+          <p:nvPr/>
+        </p:nvSpPr>
+        <p:spPr>
+          <a:xfrm>
+            <a:off x="1130550" y="4138250"/>
+            <a:ext cx="6882900" cy="461700"/>
+          </a:xfrm>
+          <a:prstGeom prst="rect">
+            <a:avLst/>
+          </a:prstGeom>
+          <a:noFill/>
+          <a:ln>
+            <a:noFill/>
+          </a:ln>
+        </p:spPr>
+        <p:txBody>
+          <a:bodyPr anchorCtr="0" anchor="t" bIns="91425" lIns="91425" spcFirstLastPara="1" rIns="91425" wrap="square" tIns="91425">
+            <a:spAutoFit/>
+          </a:bodyPr>
+          <a:lstStyle/>
+          <a:p>
+            <a:pPr indent="0" lvl="0" marL="0" rtl="0" algn="l">
+              <a:spcBef>
+                <a:spcPts val="0"/>
+              </a:spcBef>
+              <a:spcAft>
+                <a:spcPts val="0"/>
+              </a:spcAft>
+              <a:buNone/>
+            </a:pPr>
+            <a:r>
+              <a:rPr lang="en" sz="1800">
+                <a:solidFill>
+                  <a:schemeClr val="dk2"/>
+                </a:solidFill>
+              </a:rPr>
+              <a:t>* Includes test socket stubs to simulate network connections</a:t>
+            </a:r>
+            <a:endParaRPr sz="1800">
+              <a:solidFill>
+                <a:schemeClr val="dk2"/>
+              </a:solidFill>
+            </a:endParaRPr>
+          </a:p>
+        </p:txBody>
+      </p:sp>
+    </p:spTree>
+  </p:cSld>
+  <p:clrMapOvr>
+    <a:masterClrMapping/>
+  </p:clrMapOvr>
+</p:sld>
+</file>
+
+<file path=ppt/slides/slide13.xml><?xml version="1.0" encoding="utf-8"?>
+<p:sld xmlns:a="http://schemas.openxmlformats.org/drawingml/2006/main" xmlns:r="http://schemas.openxmlformats.org/officeDocument/2006/relationships" xmlns:mc="http://schemas.openxmlformats.org/markup-compatibility/2006" xmlns:mv="urn:schemas-microsoft-com:mac:vml" xmlns:p="http://schemas.openxmlformats.org/presentationml/2006/main" xmlns:c="http://schemas.openxmlformats.org/drawingml/2006/chart" xmlns:dgm="http://schemas.openxmlformats.org/drawingml/2006/diagram" xmlns:o="urn:schemas-microsoft-com:office:office" xmlns:v="urn:schemas-microsoft-com:vml" xmlns:pvml="urn:schemas-microsoft-com:office:powerpoint" xmlns:com="http://schemas.openxmlformats.org/drawingml/2006/compatibility" xmlns:p14="http://schemas.microsoft.com/office/powerpoint/2010/main" xmlns:p15="http://schemas.microsoft.com/office/powerpoint/2012/main" xmlns:ahyp="http://schemas.microsoft.com/office/drawing/2018/hyperlinkcolor">
+  <p:cSld>
+    <p:spTree>
+      <p:nvGrpSpPr>
+        <p:cNvPr id="129" name="Shape 129"/>
+        <p:cNvGrpSpPr/>
+        <p:nvPr/>
+      </p:nvGrpSpPr>
+      <p:grpSpPr>
+        <a:xfrm>
+          <a:off x="0" y="0"/>
+          <a:ext cx="0" cy="0"/>
+          <a:chOff x="0" y="0"/>
+          <a:chExt cx="0" cy="0"/>
+        </a:xfrm>
+      </p:grpSpPr>
+      <p:sp>
+        <p:nvSpPr>
+          <p:cNvPr id="130" name="Google Shape;130;p25"/>
+          <p:cNvSpPr txBox="1"/>
+          <p:nvPr>
+            <p:ph type="title"/>
+          </p:nvPr>
+        </p:nvSpPr>
+        <p:spPr>
+          <a:xfrm>
+            <a:off x="311700" y="55075"/>
+            <a:ext cx="8520600" cy="572700"/>
+          </a:xfrm>
+          <a:prstGeom prst="rect">
+            <a:avLst/>
+          </a:prstGeom>
+        </p:spPr>
+        <p:txBody>
+          <a:bodyPr anchorCtr="0" anchor="t" bIns="91425" lIns="91425" spcFirstLastPara="1" rIns="91425" wrap="square" tIns="91425">
+            <a:normAutofit fontScale="90000"/>
+          </a:bodyPr>
+          <a:lstStyle/>
+          <a:p>
+            <a:pPr indent="0" lvl="0" marL="0" rtl="0" algn="l">
+              <a:spcBef>
+                <a:spcPts val="0"/>
+              </a:spcBef>
+              <a:spcAft>
+                <a:spcPts val="0"/>
+              </a:spcAft>
+              <a:buClr>
+                <a:schemeClr val="dk1"/>
+              </a:buClr>
+              <a:buSzPct val="39285"/>
+              <a:buFont typeface="Arial"/>
+              <a:buNone/>
+            </a:pPr>
+            <a:r>
+              <a:rPr lang="en"/>
+              <a:t>Unit Testing - Zoheb</a:t>
+            </a:r>
+            <a:endParaRPr/>
+          </a:p>
+          <a:p>
+            <a:pPr indent="0" lvl="0" marL="0" rtl="0" algn="l">
+              <a:spcBef>
+                <a:spcPts val="0"/>
+              </a:spcBef>
+              <a:spcAft>
+                <a:spcPts val="0"/>
+              </a:spcAft>
+              <a:buNone/>
+            </a:pPr>
+            <a:r>
+              <a:t/>
+            </a:r>
+            <a:endParaRPr/>
+          </a:p>
+        </p:txBody>
+      </p:sp>
+      <p:sp>
+        <p:nvSpPr>
+          <p:cNvPr id="131" name="Google Shape;131;p25"/>
+          <p:cNvSpPr txBox="1"/>
+          <p:nvPr>
+            <p:ph idx="1" type="body"/>
+          </p:nvPr>
+        </p:nvSpPr>
+        <p:spPr>
+          <a:xfrm>
+            <a:off x="311700" y="1152475"/>
+            <a:ext cx="8520600" cy="3416400"/>
+          </a:xfrm>
+          <a:prstGeom prst="rect">
+            <a:avLst/>
+          </a:prstGeom>
+        </p:spPr>
+        <p:txBody>
+          <a:bodyPr anchorCtr="0" anchor="t" bIns="91425" lIns="91425" spcFirstLastPara="1" rIns="91425" wrap="square" tIns="91425">
+            <a:normAutofit/>
+          </a:bodyPr>
+          <a:lstStyle/>
+          <a:p>
+            <a:pPr indent="0" lvl="0" marL="0" rtl="0" algn="l">
+              <a:spcBef>
+                <a:spcPts val="0"/>
+              </a:spcBef>
+              <a:spcAft>
+                <a:spcPts val="1200"/>
+              </a:spcAft>
+              <a:buNone/>
+            </a:pPr>
+            <a:r>
+              <a:t/>
+            </a:r>
+            <a:endParaRPr/>
+          </a:p>
+        </p:txBody>
+      </p:sp>
+      <p:pic>
+        <p:nvPicPr>
+          <p:cNvPr id="132" name="Google Shape;132;p25"/>
+          <p:cNvPicPr preferRelativeResize="0"/>
+          <p:nvPr/>
+        </p:nvPicPr>
+        <p:blipFill>
+          <a:blip r:embed="rId3">
+            <a:alphaModFix/>
+          </a:blip>
+          <a:stretch>
+            <a:fillRect/>
+          </a:stretch>
+        </p:blipFill>
+        <p:spPr>
+          <a:xfrm>
+            <a:off x="102300" y="669450"/>
+            <a:ext cx="8939402" cy="4474051"/>
+          </a:xfrm>
+          <a:prstGeom prst="rect">
+            <a:avLst/>
+          </a:prstGeom>
+          <a:noFill/>
+          <a:ln>
+            <a:noFill/>
+          </a:ln>
+        </p:spPr>
+      </p:pic>
+    </p:spTree>
+  </p:cSld>
+  <p:clrMapOvr>
+    <a:masterClrMapping/>
+  </p:clrMapOvr>
+</p:sld>
+</file>
+
+<file path=ppt/slides/slide14.xml><?xml version="1.0" encoding="utf-8"?>
+<p:sld xmlns:a="http://schemas.openxmlformats.org/drawingml/2006/main" xmlns:r="http://schemas.openxmlformats.org/officeDocument/2006/relationships" xmlns:mc="http://schemas.openxmlformats.org/markup-compatibility/2006" xmlns:mv="urn:schemas-microsoft-com:mac:vml" xmlns:p="http://schemas.openxmlformats.org/presentationml/2006/main" xmlns:c="http://schemas.openxmlformats.org/drawingml/2006/chart" xmlns:dgm="http://schemas.openxmlformats.org/drawingml/2006/diagram" xmlns:o="urn:schemas-microsoft-com:office:office" xmlns:v="urn:schemas-microsoft-com:vml" xmlns:pvml="urn:schemas-microsoft-com:office:powerpoint" xmlns:com="http://schemas.openxmlformats.org/drawingml/2006/compatibility" xmlns:p14="http://schemas.microsoft.com/office/powerpoint/2010/main" xmlns:p15="http://schemas.microsoft.com/office/powerpoint/2012/main" xmlns:ahyp="http://schemas.microsoft.com/office/drawing/2018/hyperlinkcolor">
+  <p:cSld>
+    <p:spTree>
+      <p:nvGrpSpPr>
+        <p:cNvPr id="136" name="Shape 136"/>
+        <p:cNvGrpSpPr/>
+        <p:nvPr/>
+      </p:nvGrpSpPr>
+      <p:grpSpPr>
+        <a:xfrm>
+          <a:off x="0" y="0"/>
+          <a:ext cx="0" cy="0"/>
+          <a:chOff x="0" y="0"/>
+          <a:chExt cx="0" cy="0"/>
+        </a:xfrm>
+      </p:grpSpPr>
+      <p:sp>
+        <p:nvSpPr>
+          <p:cNvPr id="137" name="Google Shape;137;p26"/>
+          <p:cNvSpPr txBox="1"/>
+          <p:nvPr>
+            <p:ph type="title"/>
+          </p:nvPr>
+        </p:nvSpPr>
+        <p:spPr>
+          <a:xfrm>
+            <a:off x="311700" y="122375"/>
+            <a:ext cx="8520600" cy="572700"/>
+          </a:xfrm>
+          <a:prstGeom prst="rect">
+            <a:avLst/>
+          </a:prstGeom>
+        </p:spPr>
+        <p:txBody>
+          <a:bodyPr anchorCtr="0" anchor="t" bIns="91425" lIns="91425" spcFirstLastPara="1" rIns="91425" wrap="square" tIns="91425">
+            <a:normAutofit fontScale="90000"/>
+          </a:bodyPr>
+          <a:lstStyle/>
+          <a:p>
+            <a:pPr indent="0" lvl="0" marL="0" rtl="0" algn="l">
+              <a:spcBef>
+                <a:spcPts val="0"/>
+              </a:spcBef>
+              <a:spcAft>
+                <a:spcPts val="0"/>
+              </a:spcAft>
+              <a:buNone/>
+            </a:pPr>
+            <a:r>
+              <a:rPr lang="en"/>
+              <a:t>Unit Testing - Zoheb</a:t>
+            </a:r>
+            <a:endParaRPr/>
+          </a:p>
+        </p:txBody>
+      </p:sp>
+      <p:sp>
+        <p:nvSpPr>
+          <p:cNvPr id="138" name="Google Shape;138;p26"/>
+          <p:cNvSpPr txBox="1"/>
+          <p:nvPr>
+            <p:ph idx="1" type="body"/>
+          </p:nvPr>
+        </p:nvSpPr>
+        <p:spPr>
+          <a:xfrm>
+            <a:off x="311700" y="1152475"/>
+            <a:ext cx="8520600" cy="3416400"/>
+          </a:xfrm>
+          <a:prstGeom prst="rect">
+            <a:avLst/>
+          </a:prstGeom>
+        </p:spPr>
+        <p:txBody>
+          <a:bodyPr anchorCtr="0" anchor="t" bIns="91425" lIns="91425" spcFirstLastPara="1" rIns="91425" wrap="square" tIns="91425">
+            <a:normAutofit/>
+          </a:bodyPr>
+          <a:lstStyle/>
+          <a:p>
+            <a:pPr indent="0" lvl="0" marL="0" rtl="0" algn="l">
+              <a:spcBef>
+                <a:spcPts val="0"/>
+              </a:spcBef>
+              <a:spcAft>
+                <a:spcPts val="1200"/>
+              </a:spcAft>
+              <a:buNone/>
+            </a:pPr>
+            <a:r>
+              <a:t/>
+            </a:r>
+            <a:endParaRPr/>
+          </a:p>
+        </p:txBody>
+      </p:sp>
+      <p:pic>
+        <p:nvPicPr>
+          <p:cNvPr id="139" name="Google Shape;139;p26"/>
+          <p:cNvPicPr preferRelativeResize="0"/>
+          <p:nvPr/>
+        </p:nvPicPr>
+        <p:blipFill>
+          <a:blip r:embed="rId3">
+            <a:alphaModFix/>
+          </a:blip>
+          <a:stretch>
+            <a:fillRect/>
+          </a:stretch>
+        </p:blipFill>
+        <p:spPr>
+          <a:xfrm>
+            <a:off x="0" y="736254"/>
+            <a:ext cx="9144003" cy="4344294"/>
+          </a:xfrm>
+          <a:prstGeom prst="rect">
+            <a:avLst/>
+          </a:prstGeom>
+          <a:noFill/>
+          <a:ln>
+            <a:noFill/>
+          </a:ln>
+        </p:spPr>
+      </p:pic>
+    </p:spTree>
+  </p:cSld>
+  <p:clrMapOvr>
+    <a:masterClrMapping/>
+  </p:clrMapOvr>
+</p:sld>
+</file>
+
+<file path=ppt/slides/slide15.xml><?xml version="1.0" encoding="utf-8"?>
+<p:sld xmlns:a="http://schemas.openxmlformats.org/drawingml/2006/main" xmlns:r="http://schemas.openxmlformats.org/officeDocument/2006/relationships" xmlns:mc="http://schemas.openxmlformats.org/markup-compatibility/2006" xmlns:mv="urn:schemas-microsoft-com:mac:vml" xmlns:p="http://schemas.openxmlformats.org/presentationml/2006/main" xmlns:c="http://schemas.openxmlformats.org/drawingml/2006/chart" xmlns:dgm="http://schemas.openxmlformats.org/drawingml/2006/diagram" xmlns:o="urn:schemas-microsoft-com:office:office" xmlns:v="urn:schemas-microsoft-com:vml" xmlns:pvml="urn:schemas-microsoft-com:office:powerpoint" xmlns:com="http://schemas.openxmlformats.org/drawingml/2006/compatibility" xmlns:p14="http://schemas.microsoft.com/office/powerpoint/2010/main" xmlns:p15="http://schemas.microsoft.com/office/powerpoint/2012/main" xmlns:ahyp="http://schemas.microsoft.com/office/drawing/2018/hyperlinkcolor">
+  <p:cSld>
+    <p:spTree>
+      <p:nvGrpSpPr>
+        <p:cNvPr id="143" name="Shape 143"/>
+        <p:cNvGrpSpPr/>
+        <p:nvPr/>
+      </p:nvGrpSpPr>
+      <p:grpSpPr>
+        <a:xfrm>
+          <a:off x="0" y="0"/>
+          <a:ext cx="0" cy="0"/>
+          <a:chOff x="0" y="0"/>
+          <a:chExt cx="0" cy="0"/>
+        </a:xfrm>
+      </p:grpSpPr>
+      <p:sp>
+        <p:nvSpPr>
+          <p:cNvPr id="144" name="Google Shape;144;p27"/>
+          <p:cNvSpPr txBox="1"/>
+          <p:nvPr>
+            <p:ph type="title"/>
+          </p:nvPr>
+        </p:nvSpPr>
+        <p:spPr>
+          <a:xfrm>
+            <a:off x="311700" y="445025"/>
+            <a:ext cx="8520600" cy="572700"/>
+          </a:xfrm>
+          <a:prstGeom prst="rect">
+            <a:avLst/>
+          </a:prstGeom>
+        </p:spPr>
+        <p:txBody>
+          <a:bodyPr anchorCtr="0" anchor="t" bIns="91425" lIns="91425" spcFirstLastPara="1" rIns="91425" wrap="square" tIns="91425">
+            <a:normAutofit fontScale="90000"/>
+          </a:bodyPr>
+          <a:lstStyle/>
+          <a:p>
+            <a:pPr indent="0" lvl="0" marL="0" rtl="0" algn="l">
+              <a:spcBef>
+                <a:spcPts val="0"/>
+              </a:spcBef>
+              <a:spcAft>
+                <a:spcPts val="0"/>
+              </a:spcAft>
+              <a:buNone/>
+            </a:pPr>
+            <a:r>
+              <a:rPr lang="en"/>
+              <a:t>OTHER</a:t>
+            </a:r>
+            <a:endParaRPr/>
+          </a:p>
+        </p:txBody>
+      </p:sp>
+      <p:sp>
+        <p:nvSpPr>
+          <p:cNvPr id="145" name="Google Shape;145;p27"/>
+          <p:cNvSpPr txBox="1"/>
+          <p:nvPr>
+            <p:ph idx="1" type="body"/>
+          </p:nvPr>
+        </p:nvSpPr>
+        <p:spPr>
+          <a:xfrm>
+            <a:off x="311700" y="1152475"/>
+            <a:ext cx="8520600" cy="3416400"/>
+          </a:xfrm>
+          <a:prstGeom prst="rect">
+            <a:avLst/>
+          </a:prstGeom>
+        </p:spPr>
+        <p:txBody>
+          <a:bodyPr anchorCtr="0" anchor="t" bIns="91425" lIns="91425" spcFirstLastPara="1" rIns="91425" wrap="square" tIns="91425">
+            <a:normAutofit/>
+          </a:bodyPr>
+          <a:lstStyle/>
+          <a:p>
+            <a:pPr indent="0" lvl="0" marL="0" rtl="0" algn="l">
+              <a:spcBef>
+                <a:spcPts val="0"/>
+              </a:spcBef>
+              <a:spcAft>
+                <a:spcPts val="1200"/>
+              </a:spcAft>
+              <a:buNone/>
+            </a:pPr>
+            <a:r>
+              <a:t/>
+            </a:r>
+            <a:endParaRPr/>
+          </a:p>
+        </p:txBody>
+      </p:sp>
+    </p:spTree>
+  </p:cSld>
+  <p:clrMapOvr>
+    <a:masterClrMapping/>
+  </p:clrMapOvr>
+</p:sld>
+</file>
+
+<file path=ppt/slides/slide2.xml><?xml version="1.0" encoding="utf-8"?>
+<p:sld xmlns:a="http://schemas.openxmlformats.org/drawingml/2006/main" xmlns:r="http://schemas.openxmlformats.org/officeDocument/2006/relationships" xmlns:mc="http://schemas.openxmlformats.org/markup-compatibility/2006" xmlns:mv="urn:schemas-microsoft-com:mac:vml" xmlns:p="http://schemas.openxmlformats.org/presentationml/2006/main" xmlns:c="http://schemas.openxmlformats.org/drawingml/2006/chart" xmlns:dgm="http://schemas.openxmlformats.org/drawingml/2006/diagram" xmlns:o="urn:schemas-microsoft-com:office:office" xmlns:v="urn:schemas-microsoft-com:vml" xmlns:pvml="urn:schemas-microsoft-com:office:powerpoint" xmlns:com="http://schemas.openxmlformats.org/drawingml/2006/compatibility" xmlns:p14="http://schemas.microsoft.com/office/powerpoint/2010/main" xmlns:p15="http://schemas.microsoft.com/office/powerpoint/2012/main" xmlns:ahyp="http://schemas.microsoft.com/office/drawing/2018/hyperlinkcolor">
+  <p:cSld>
+    <p:spTree>
+      <p:nvGrpSpPr>
+        <p:cNvPr id="59" name="Shape 59"/>
+        <p:cNvGrpSpPr/>
+        <p:nvPr/>
+      </p:nvGrpSpPr>
+      <p:grpSpPr>
+        <a:xfrm>
+          <a:off x="0" y="0"/>
+          <a:ext cx="0" cy="0"/>
+          <a:chOff x="0" y="0"/>
+          <a:chExt cx="0" cy="0"/>
+        </a:xfrm>
+      </p:grpSpPr>
+      <p:sp>
+        <p:nvSpPr>
+          <p:cNvPr id="60" name="Google Shape;60;p14"/>
+          <p:cNvSpPr txBox="1"/>
+          <p:nvPr>
+            <p:ph type="title"/>
+          </p:nvPr>
+        </p:nvSpPr>
+        <p:spPr>
+          <a:xfrm>
+            <a:off x="311700" y="445025"/>
+            <a:ext cx="8520600" cy="572700"/>
+          </a:xfrm>
+          <a:prstGeom prst="rect">
+            <a:avLst/>
+          </a:prstGeom>
+        </p:spPr>
+        <p:txBody>
+          <a:bodyPr anchorCtr="0" anchor="t" bIns="91425" lIns="91425" spcFirstLastPara="1" rIns="91425" wrap="square" tIns="91425">
+            <a:normAutofit fontScale="90000"/>
+          </a:bodyPr>
+          <a:lstStyle/>
+          <a:p>
+            <a:pPr indent="0" lvl="0" marL="0" rtl="0" algn="l">
+              <a:spcBef>
+                <a:spcPts val="0"/>
+              </a:spcBef>
+              <a:spcAft>
+                <a:spcPts val="0"/>
+              </a:spcAft>
+              <a:buNone/>
+            </a:pPr>
+            <a:r>
+              <a:rPr lang="en"/>
+              <a:t>MESSAGE - ZOHEB</a:t>
+            </a:r>
+            <a:endParaRPr/>
+          </a:p>
+          <a:p>
+            <a:pPr indent="0" lvl="0" marL="0" rtl="0" algn="l">
+              <a:spcBef>
+                <a:spcPts val="0"/>
+              </a:spcBef>
+              <a:spcAft>
+                <a:spcPts val="0"/>
+              </a:spcAft>
+              <a:buNone/>
+            </a:pPr>
+            <a:r>
+              <a:t/>
+            </a:r>
+            <a:endParaRPr/>
+          </a:p>
+        </p:txBody>
+      </p:sp>
+      <p:sp>
+        <p:nvSpPr>
+          <p:cNvPr id="61" name="Google Shape;61;p14"/>
+          <p:cNvSpPr txBox="1"/>
+          <p:nvPr>
+            <p:ph idx="1" type="body"/>
+          </p:nvPr>
+        </p:nvSpPr>
+        <p:spPr>
+          <a:xfrm>
+            <a:off x="311700" y="1132175"/>
+            <a:ext cx="8520600" cy="3416400"/>
+          </a:xfrm>
+          <a:prstGeom prst="rect">
+            <a:avLst/>
+          </a:prstGeom>
+        </p:spPr>
+        <p:txBody>
+          <a:bodyPr anchorCtr="0" anchor="t" bIns="91425" lIns="91425" spcFirstLastPara="1" rIns="91425" wrap="square" tIns="91425">
+            <a:normAutofit/>
+          </a:bodyPr>
+          <a:lstStyle/>
+          <a:p>
+            <a:pPr indent="-381000" lvl="0" marL="457200" rtl="0" algn="l">
+              <a:spcBef>
+                <a:spcPts val="0"/>
+              </a:spcBef>
+              <a:spcAft>
+                <a:spcPts val="0"/>
+              </a:spcAft>
+              <a:buClr>
+                <a:schemeClr val="dk1"/>
+              </a:buClr>
+              <a:buSzPts val="2400"/>
+              <a:buChar char="●"/>
+            </a:pPr>
+            <a:r>
+              <a:rPr lang="en" sz="2400">
+                <a:solidFill>
+                  <a:schemeClr val="dk1"/>
+                </a:solidFill>
+              </a:rPr>
+              <a:t>Represents individual text messages in the chat system</a:t>
+            </a:r>
+            <a:endParaRPr sz="2400">
+              <a:solidFill>
+                <a:schemeClr val="dk1"/>
+              </a:solidFill>
+            </a:endParaRPr>
+          </a:p>
+          <a:p>
+            <a:pPr indent="-381000" lvl="0" marL="457200" rtl="0" algn="l">
+              <a:spcBef>
+                <a:spcPts val="0"/>
+              </a:spcBef>
+              <a:spcAft>
+                <a:spcPts val="0"/>
+              </a:spcAft>
+              <a:buClr>
+                <a:schemeClr val="dk1"/>
+              </a:buClr>
+              <a:buSzPts val="2400"/>
+              <a:buChar char="●"/>
+            </a:pPr>
+            <a:r>
+              <a:rPr lang="en" sz="2400">
+                <a:solidFill>
+                  <a:schemeClr val="dk1"/>
+                </a:solidFill>
+              </a:rPr>
+              <a:t>Tracks unique message ID via a static counter</a:t>
+            </a:r>
+            <a:endParaRPr sz="2400">
+              <a:solidFill>
+                <a:schemeClr val="dk1"/>
+              </a:solidFill>
+            </a:endParaRPr>
+          </a:p>
+          <a:p>
+            <a:pPr indent="-381000" lvl="0" marL="457200" rtl="0" algn="l">
+              <a:spcBef>
+                <a:spcPts val="0"/>
+              </a:spcBef>
+              <a:spcAft>
+                <a:spcPts val="0"/>
+              </a:spcAft>
+              <a:buClr>
+                <a:schemeClr val="dk1"/>
+              </a:buClr>
+              <a:buSzPts val="2400"/>
+              <a:buChar char="●"/>
+            </a:pPr>
+            <a:r>
+              <a:rPr lang="en" sz="2400">
+                <a:solidFill>
+                  <a:schemeClr val="dk1"/>
+                </a:solidFill>
+              </a:rPr>
+              <a:t>Stores a timestamp at the time of creation, content, sender, and destination chat</a:t>
+            </a:r>
+            <a:endParaRPr sz="2400">
+              <a:solidFill>
+                <a:schemeClr val="dk1"/>
+              </a:solidFill>
+            </a:endParaRPr>
+          </a:p>
+          <a:p>
+            <a:pPr indent="-381000" lvl="0" marL="457200" rtl="0" algn="l">
+              <a:spcBef>
+                <a:spcPts val="0"/>
+              </a:spcBef>
+              <a:spcAft>
+                <a:spcPts val="0"/>
+              </a:spcAft>
+              <a:buClr>
+                <a:schemeClr val="dk1"/>
+              </a:buClr>
+              <a:buSzPts val="2400"/>
+              <a:buChar char="●"/>
+            </a:pPr>
+            <a:r>
+              <a:rPr lang="en" sz="2400">
+                <a:solidFill>
+                  <a:schemeClr val="dk1"/>
+                </a:solidFill>
+              </a:rPr>
+              <a:t>Associates messages with both sender and chat room</a:t>
+            </a:r>
+            <a:endParaRPr sz="2400">
+              <a:solidFill>
+                <a:schemeClr val="dk1"/>
+              </a:solidFill>
+            </a:endParaRPr>
+          </a:p>
+        </p:txBody>
+      </p:sp>
+    </p:spTree>
+  </p:cSld>
+  <p:clrMapOvr>
+    <a:masterClrMapping/>
+  </p:clrMapOvr>
+</p:sld>
+</file>
+
+<file path=ppt/slides/slide3.xml><?xml version="1.0" encoding="utf-8"?>
+<p:sld xmlns:a="http://schemas.openxmlformats.org/drawingml/2006/main" xmlns:r="http://schemas.openxmlformats.org/officeDocument/2006/relationships" xmlns:mc="http://schemas.openxmlformats.org/markup-compatibility/2006" xmlns:mv="urn:schemas-microsoft-com:mac:vml" xmlns:p="http://schemas.openxmlformats.org/presentationml/2006/main" xmlns:c="http://schemas.openxmlformats.org/drawingml/2006/chart" xmlns:dgm="http://schemas.openxmlformats.org/drawingml/2006/diagram" xmlns:o="urn:schemas-microsoft-com:office:office" xmlns:v="urn:schemas-microsoft-com:vml" xmlns:pvml="urn:schemas-microsoft-com:office:powerpoint" xmlns:com="http://schemas.openxmlformats.org/drawingml/2006/compatibility" xmlns:p14="http://schemas.microsoft.com/office/powerpoint/2010/main" xmlns:p15="http://schemas.microsoft.com/office/powerpoint/2012/main" xmlns:ahyp="http://schemas.microsoft.com/office/drawing/2018/hyperlinkcolor">
+  <p:cSld>
+    <p:spTree>
+      <p:nvGrpSpPr>
+        <p:cNvPr id="65" name="Shape 65"/>
+        <p:cNvGrpSpPr/>
+        <p:nvPr/>
+      </p:nvGrpSpPr>
+      <p:grpSpPr>
+        <a:xfrm>
+          <a:off x="0" y="0"/>
+          <a:ext cx="0" cy="0"/>
+          <a:chOff x="0" y="0"/>
+          <a:chExt cx="0" cy="0"/>
+        </a:xfrm>
+      </p:grpSpPr>
+      <p:sp>
+        <p:nvSpPr>
+          <p:cNvPr id="66" name="Google Shape;66;p15"/>
+          <p:cNvSpPr txBox="1"/>
+          <p:nvPr>
+            <p:ph type="title"/>
+          </p:nvPr>
+        </p:nvSpPr>
+        <p:spPr>
+          <a:xfrm>
+            <a:off x="365825" y="431500"/>
+            <a:ext cx="8520600" cy="572700"/>
+          </a:xfrm>
+          <a:prstGeom prst="rect">
+            <a:avLst/>
+          </a:prstGeom>
+        </p:spPr>
+        <p:txBody>
+          <a:bodyPr anchorCtr="0" anchor="t" bIns="91425" lIns="91425" spcFirstLastPara="1" rIns="91425" wrap="square" tIns="91425">
+            <a:normAutofit fontScale="90000"/>
+          </a:bodyPr>
+          <a:lstStyle/>
+          <a:p>
+            <a:pPr indent="0" lvl="0" marL="0" rtl="0" algn="l">
+              <a:spcBef>
+                <a:spcPts val="0"/>
+              </a:spcBef>
+              <a:spcAft>
+                <a:spcPts val="0"/>
+              </a:spcAft>
+              <a:buNone/>
+            </a:pPr>
+            <a:r>
+              <a:rPr lang="en"/>
+              <a:t>USER/ABSTRACTUSER - ZOHEB</a:t>
+            </a:r>
+            <a:endParaRPr/>
+          </a:p>
+          <a:p>
+            <a:pPr indent="0" lvl="0" marL="0" rtl="0" algn="l">
+              <a:spcBef>
+                <a:spcPts val="0"/>
+              </a:spcBef>
+              <a:spcAft>
+                <a:spcPts val="0"/>
+              </a:spcAft>
+              <a:buNone/>
+            </a:pPr>
+            <a:r>
+              <a:t/>
+            </a:r>
+            <a:endParaRPr/>
+          </a:p>
+        </p:txBody>
+      </p:sp>
+      <p:sp>
+        <p:nvSpPr>
+          <p:cNvPr id="67" name="Google Shape;67;p15"/>
+          <p:cNvSpPr txBox="1"/>
+          <p:nvPr>
+            <p:ph idx="1" type="body"/>
+          </p:nvPr>
+        </p:nvSpPr>
+        <p:spPr>
+          <a:xfrm>
+            <a:off x="311700" y="1132175"/>
+            <a:ext cx="8520600" cy="3416400"/>
+          </a:xfrm>
+          <a:prstGeom prst="rect">
+            <a:avLst/>
+          </a:prstGeom>
+        </p:spPr>
+        <p:txBody>
+          <a:bodyPr anchorCtr="0" anchor="t" bIns="91425" lIns="91425" spcFirstLastPara="1" rIns="91425" wrap="square" tIns="91425">
+            <a:normAutofit/>
+          </a:bodyPr>
+          <a:lstStyle/>
+          <a:p>
+            <a:pPr indent="-381000" lvl="0" marL="457200" rtl="0" algn="l">
+              <a:spcBef>
+                <a:spcPts val="0"/>
+              </a:spcBef>
+              <a:spcAft>
+                <a:spcPts val="0"/>
+              </a:spcAft>
+              <a:buClr>
+                <a:schemeClr val="dk1"/>
+              </a:buClr>
+              <a:buSzPts val="2400"/>
+              <a:buChar char="●"/>
+            </a:pPr>
+            <a:r>
+              <a:rPr lang="en" sz="2400">
+                <a:solidFill>
+                  <a:schemeClr val="dk1"/>
+                </a:solidFill>
+              </a:rPr>
+              <a:t>Represents an account in the system.</a:t>
+            </a:r>
+            <a:endParaRPr sz="2400">
+              <a:solidFill>
+                <a:schemeClr val="dk1"/>
+              </a:solidFill>
+            </a:endParaRPr>
+          </a:p>
+          <a:p>
+            <a:pPr indent="-381000" lvl="0" marL="457200" rtl="0" algn="l">
+              <a:spcBef>
+                <a:spcPts val="0"/>
+              </a:spcBef>
+              <a:spcAft>
+                <a:spcPts val="0"/>
+              </a:spcAft>
+              <a:buClr>
+                <a:schemeClr val="dk1"/>
+              </a:buClr>
+              <a:buSzPts val="2400"/>
+              <a:buChar char="●"/>
+            </a:pPr>
+            <a:r>
+              <a:rPr lang="en" sz="2400">
+                <a:solidFill>
+                  <a:schemeClr val="dk1"/>
+                </a:solidFill>
+              </a:rPr>
+              <a:t>Stores personal data like name, username, password.</a:t>
+            </a:r>
+            <a:endParaRPr sz="2400">
+              <a:solidFill>
+                <a:schemeClr val="dk1"/>
+              </a:solidFill>
+            </a:endParaRPr>
+          </a:p>
+          <a:p>
+            <a:pPr indent="-381000" lvl="0" marL="457200" rtl="0" algn="l">
+              <a:spcBef>
+                <a:spcPts val="0"/>
+              </a:spcBef>
+              <a:spcAft>
+                <a:spcPts val="0"/>
+              </a:spcAft>
+              <a:buClr>
+                <a:schemeClr val="dk1"/>
+              </a:buClr>
+              <a:buSzPts val="2400"/>
+              <a:buChar char="●"/>
+            </a:pPr>
+            <a:r>
+              <a:rPr lang="en" sz="2400">
+                <a:solidFill>
+                  <a:schemeClr val="dk1"/>
+                </a:solidFill>
+              </a:rPr>
+              <a:t>Contains unique ID.</a:t>
+            </a:r>
+            <a:endParaRPr sz="2400">
+              <a:solidFill>
+                <a:schemeClr val="dk1"/>
+              </a:solidFill>
+            </a:endParaRPr>
+          </a:p>
+          <a:p>
+            <a:pPr indent="-381000" lvl="0" marL="457200" rtl="0" algn="l">
+              <a:spcBef>
+                <a:spcPts val="0"/>
+              </a:spcBef>
+              <a:spcAft>
+                <a:spcPts val="0"/>
+              </a:spcAft>
+              <a:buClr>
+                <a:schemeClr val="dk1"/>
+              </a:buClr>
+              <a:buSzPts val="2400"/>
+              <a:buChar char="●"/>
+            </a:pPr>
+            <a:r>
+              <a:rPr lang="en" sz="2400">
+                <a:solidFill>
+                  <a:schemeClr val="dk1"/>
+                </a:solidFill>
+              </a:rPr>
+              <a:t>Tracks associated chat rooms</a:t>
+            </a:r>
+            <a:endParaRPr sz="2400">
+              <a:solidFill>
+                <a:schemeClr val="dk1"/>
+              </a:solidFill>
+            </a:endParaRPr>
+          </a:p>
+          <a:p>
+            <a:pPr indent="-381000" lvl="0" marL="457200" rtl="0" algn="l">
+              <a:spcBef>
+                <a:spcPts val="0"/>
+              </a:spcBef>
+              <a:spcAft>
+                <a:spcPts val="0"/>
+              </a:spcAft>
+              <a:buClr>
+                <a:schemeClr val="dk1"/>
+              </a:buClr>
+              <a:buSzPts val="2400"/>
+              <a:buChar char="●"/>
+            </a:pPr>
+            <a:r>
+              <a:rPr lang="en" sz="2400">
+                <a:solidFill>
+                  <a:schemeClr val="dk1"/>
+                </a:solidFill>
+              </a:rPr>
+              <a:t>Associates users with their conversations.</a:t>
+            </a:r>
+            <a:endParaRPr sz="2400">
+              <a:solidFill>
+                <a:schemeClr val="dk1"/>
+              </a:solidFill>
+            </a:endParaRPr>
+          </a:p>
+        </p:txBody>
+      </p:sp>
+    </p:spTree>
+  </p:cSld>
+  <p:clrMapOvr>
+    <a:masterClrMapping/>
+  </p:clrMapOvr>
+</p:sld>
+</file>
+
+<file path=ppt/slides/slide4.xml><?xml version="1.0" encoding="utf-8"?>
+<p:sld xmlns:a="http://schemas.openxmlformats.org/drawingml/2006/main" xmlns:r="http://schemas.openxmlformats.org/officeDocument/2006/relationships" xmlns:mc="http://schemas.openxmlformats.org/markup-compatibility/2006" xmlns:mv="urn:schemas-microsoft-com:mac:vml" xmlns:p="http://schemas.openxmlformats.org/presentationml/2006/main" xmlns:c="http://schemas.openxmlformats.org/drawingml/2006/chart" xmlns:dgm="http://schemas.openxmlformats.org/drawingml/2006/diagram" xmlns:o="urn:schemas-microsoft-com:office:office" xmlns:v="urn:schemas-microsoft-com:vml" xmlns:pvml="urn:schemas-microsoft-com:office:powerpoint" xmlns:com="http://schemas.openxmlformats.org/drawingml/2006/compatibility" xmlns:p14="http://schemas.microsoft.com/office/powerpoint/2010/main" xmlns:p15="http://schemas.microsoft.com/office/powerpoint/2012/main" xmlns:ahyp="http://schemas.microsoft.com/office/drawing/2018/hyperlinkcolor">
+  <p:cSld>
+    <p:spTree>
+      <p:nvGrpSpPr>
+        <p:cNvPr id="71" name="Shape 71"/>
+        <p:cNvGrpSpPr/>
+        <p:nvPr/>
+      </p:nvGrpSpPr>
+      <p:grpSpPr>
+        <a:xfrm>
+          <a:off x="0" y="0"/>
+          <a:ext cx="0" cy="0"/>
+          <a:chOff x="0" y="0"/>
+          <a:chExt cx="0" cy="0"/>
+        </a:xfrm>
+      </p:grpSpPr>
+      <p:sp>
+        <p:nvSpPr>
+          <p:cNvPr id="72" name="Google Shape;72;p16"/>
+          <p:cNvSpPr txBox="1"/>
+          <p:nvPr>
+            <p:ph type="title"/>
+          </p:nvPr>
+        </p:nvSpPr>
+        <p:spPr>
+          <a:xfrm>
+            <a:off x="311700" y="445025"/>
+            <a:ext cx="8520600" cy="572700"/>
+          </a:xfrm>
+          <a:prstGeom prst="rect">
+            <a:avLst/>
+          </a:prstGeom>
+        </p:spPr>
+        <p:txBody>
+          <a:bodyPr anchorCtr="0" anchor="t" bIns="91425" lIns="91425" spcFirstLastPara="1" rIns="91425" wrap="square" tIns="91425">
+            <a:normAutofit fontScale="90000"/>
+          </a:bodyPr>
+          <a:lstStyle/>
+          <a:p>
+            <a:pPr indent="0" lvl="0" marL="0" rtl="0" algn="l">
+              <a:spcBef>
+                <a:spcPts val="0"/>
+              </a:spcBef>
+              <a:spcAft>
+                <a:spcPts val="0"/>
+              </a:spcAft>
+              <a:buNone/>
+            </a:pPr>
+            <a:r>
+              <a:rPr lang="en"/>
+              <a:t>CHAT - ZOHEB</a:t>
+            </a:r>
+            <a:endParaRPr/>
+          </a:p>
+          <a:p>
+            <a:pPr indent="0" lvl="0" marL="0" rtl="0" algn="l">
+              <a:spcBef>
+                <a:spcPts val="0"/>
+              </a:spcBef>
+              <a:spcAft>
+                <a:spcPts val="0"/>
+              </a:spcAft>
+              <a:buNone/>
+            </a:pPr>
+            <a:r>
+              <a:t/>
+            </a:r>
+            <a:endParaRPr/>
+          </a:p>
+        </p:txBody>
+      </p:sp>
+      <p:sp>
+        <p:nvSpPr>
+          <p:cNvPr id="73" name="Google Shape;73;p16"/>
+          <p:cNvSpPr txBox="1"/>
+          <p:nvPr>
+            <p:ph idx="1" type="body"/>
+          </p:nvPr>
+        </p:nvSpPr>
+        <p:spPr>
+          <a:xfrm>
+            <a:off x="311700" y="1132175"/>
+            <a:ext cx="8520600" cy="3416400"/>
+          </a:xfrm>
+          <a:prstGeom prst="rect">
+            <a:avLst/>
+          </a:prstGeom>
+        </p:spPr>
+        <p:txBody>
+          <a:bodyPr anchorCtr="0" anchor="t" bIns="91425" lIns="91425" spcFirstLastPara="1" rIns="91425" wrap="square" tIns="91425">
+            <a:normAutofit lnSpcReduction="10000"/>
+          </a:bodyPr>
+          <a:lstStyle/>
+          <a:p>
+            <a:pPr indent="-381000" lvl="0" marL="457200" rtl="0" algn="l">
+              <a:spcBef>
+                <a:spcPts val="0"/>
+              </a:spcBef>
+              <a:spcAft>
+                <a:spcPts val="0"/>
+              </a:spcAft>
+              <a:buClr>
+                <a:schemeClr val="dk1"/>
+              </a:buClr>
+              <a:buSzPts val="2400"/>
+              <a:buChar char="●"/>
+            </a:pPr>
+            <a:r>
+              <a:rPr lang="en" sz="2400">
+                <a:solidFill>
+                  <a:schemeClr val="dk1"/>
+                </a:solidFill>
+              </a:rPr>
+              <a:t>Represents a </a:t>
+            </a:r>
+            <a:r>
+              <a:rPr lang="en" sz="2400">
+                <a:solidFill>
+                  <a:schemeClr val="dk1"/>
+                </a:solidFill>
+              </a:rPr>
+              <a:t>conversation</a:t>
+            </a:r>
+            <a:r>
+              <a:rPr lang="en" sz="2400">
+                <a:solidFill>
+                  <a:schemeClr val="dk1"/>
+                </a:solidFill>
+              </a:rPr>
+              <a:t> room in the messaging system.</a:t>
+            </a:r>
+            <a:endParaRPr sz="2400">
+              <a:solidFill>
+                <a:schemeClr val="dk1"/>
+              </a:solidFill>
+            </a:endParaRPr>
+          </a:p>
+          <a:p>
+            <a:pPr indent="-381000" lvl="0" marL="457200" rtl="0" algn="l">
+              <a:spcBef>
+                <a:spcPts val="0"/>
+              </a:spcBef>
+              <a:spcAft>
+                <a:spcPts val="0"/>
+              </a:spcAft>
+              <a:buClr>
+                <a:schemeClr val="dk1"/>
+              </a:buClr>
+              <a:buSzPts val="2400"/>
+              <a:buChar char="●"/>
+            </a:pPr>
+            <a:r>
+              <a:rPr lang="en" sz="2400">
+                <a:solidFill>
+                  <a:schemeClr val="dk1"/>
+                </a:solidFill>
+              </a:rPr>
+              <a:t>Stores a unique ID, room name, and list of chatters.</a:t>
+            </a:r>
+            <a:endParaRPr sz="2400">
+              <a:solidFill>
+                <a:schemeClr val="dk1"/>
+              </a:solidFill>
+            </a:endParaRPr>
+          </a:p>
+          <a:p>
+            <a:pPr indent="-381000" lvl="0" marL="457200" rtl="0" algn="l">
+              <a:spcBef>
+                <a:spcPts val="0"/>
+              </a:spcBef>
+              <a:spcAft>
+                <a:spcPts val="0"/>
+              </a:spcAft>
+              <a:buClr>
+                <a:schemeClr val="dk1"/>
+              </a:buClr>
+              <a:buSzPts val="2400"/>
+              <a:buChar char="●"/>
+            </a:pPr>
+            <a:r>
+              <a:rPr lang="en" sz="2400">
+                <a:solidFill>
+                  <a:schemeClr val="dk1"/>
+                </a:solidFill>
+              </a:rPr>
+              <a:t>Supports public and private chat rooms, where privacy affects who can add new members.</a:t>
+            </a:r>
+            <a:endParaRPr sz="2400">
+              <a:solidFill>
+                <a:schemeClr val="dk1"/>
+              </a:solidFill>
+            </a:endParaRPr>
+          </a:p>
+          <a:p>
+            <a:pPr indent="-381000" lvl="0" marL="457200" rtl="0" algn="l">
+              <a:spcBef>
+                <a:spcPts val="0"/>
+              </a:spcBef>
+              <a:spcAft>
+                <a:spcPts val="0"/>
+              </a:spcAft>
+              <a:buClr>
+                <a:schemeClr val="dk1"/>
+              </a:buClr>
+              <a:buSzPts val="2400"/>
+              <a:buChar char="●"/>
+            </a:pPr>
+            <a:r>
+              <a:rPr lang="en" sz="2400">
+                <a:solidFill>
+                  <a:schemeClr val="dk1"/>
+                </a:solidFill>
+              </a:rPr>
+              <a:t>Used when creating or loading chat sessions from file.</a:t>
+            </a:r>
+            <a:endParaRPr sz="2400">
+              <a:solidFill>
+                <a:schemeClr val="dk1"/>
+              </a:solidFill>
+            </a:endParaRPr>
+          </a:p>
+          <a:p>
+            <a:pPr indent="-381000" lvl="0" marL="457200" rtl="0" algn="l">
+              <a:spcBef>
+                <a:spcPts val="0"/>
+              </a:spcBef>
+              <a:spcAft>
+                <a:spcPts val="0"/>
+              </a:spcAft>
+              <a:buClr>
+                <a:schemeClr val="dk1"/>
+              </a:buClr>
+              <a:buSzPts val="2400"/>
+              <a:buChar char="●"/>
+            </a:pPr>
+            <a:r>
+              <a:rPr lang="en" sz="2400">
+                <a:solidFill>
+                  <a:schemeClr val="dk1"/>
+                </a:solidFill>
+              </a:rPr>
+              <a:t>Chats hold User and Message </a:t>
+            </a:r>
+            <a:r>
+              <a:rPr lang="en" sz="2400">
+                <a:solidFill>
+                  <a:schemeClr val="dk1"/>
+                </a:solidFill>
+              </a:rPr>
+              <a:t>objects</a:t>
+            </a:r>
+            <a:r>
+              <a:rPr lang="en" sz="2400">
+                <a:solidFill>
+                  <a:schemeClr val="dk1"/>
+                </a:solidFill>
+              </a:rPr>
+              <a:t>.</a:t>
+            </a:r>
+            <a:endParaRPr sz="2400">
+              <a:solidFill>
+                <a:schemeClr val="dk1"/>
+              </a:solidFill>
+            </a:endParaRPr>
+          </a:p>
+          <a:p>
+            <a:pPr indent="0" lvl="0" marL="457200" rtl="0" algn="l">
+              <a:spcBef>
+                <a:spcPts val="1200"/>
+              </a:spcBef>
+              <a:spcAft>
+                <a:spcPts val="1200"/>
+              </a:spcAft>
+              <a:buNone/>
+            </a:pPr>
+            <a:r>
+              <a:t/>
+            </a:r>
+            <a:endParaRPr>
+              <a:solidFill>
+                <a:schemeClr val="dk1"/>
+              </a:solidFill>
+            </a:endParaRPr>
+          </a:p>
+        </p:txBody>
+      </p:sp>
+    </p:spTree>
+  </p:cSld>
+  <p:clrMapOvr>
+    <a:masterClrMapping/>
+  </p:clrMapOvr>
+</p:sld>
+</file>
+
+<file path=ppt/slides/slide5.xml><?xml version="1.0" encoding="utf-8"?>
+<p:sld xmlns:a="http://schemas.openxmlformats.org/drawingml/2006/main" xmlns:r="http://schemas.openxmlformats.org/officeDocument/2006/relationships" xmlns:mc="http://schemas.openxmlformats.org/markup-compatibility/2006" xmlns:mv="urn:schemas-microsoft-com:mac:vml" xmlns:p="http://schemas.openxmlformats.org/presentationml/2006/main" xmlns:c="http://schemas.openxmlformats.org/drawingml/2006/chart" xmlns:dgm="http://schemas.openxmlformats.org/drawingml/2006/diagram" xmlns:o="urn:schemas-microsoft-com:office:office" xmlns:v="urn:schemas-microsoft-com:vml" xmlns:pvml="urn:schemas-microsoft-com:office:powerpoint" xmlns:com="http://schemas.openxmlformats.org/drawingml/2006/compatibility" xmlns:p14="http://schemas.microsoft.com/office/powerpoint/2010/main" xmlns:p15="http://schemas.microsoft.com/office/powerpoint/2012/main" xmlns:ahyp="http://schemas.microsoft.com/office/drawing/2018/hyperlinkcolor">
+  <p:cSld>
+    <p:spTree>
+      <p:nvGrpSpPr>
+        <p:cNvPr id="77" name="Shape 77"/>
+        <p:cNvGrpSpPr/>
+        <p:nvPr/>
+      </p:nvGrpSpPr>
+      <p:grpSpPr>
+        <a:xfrm>
+          <a:off x="0" y="0"/>
+          <a:ext cx="0" cy="0"/>
+          <a:chOff x="0" y="0"/>
+          <a:chExt cx="0" cy="0"/>
+        </a:xfrm>
+      </p:grpSpPr>
+      <p:sp>
+        <p:nvSpPr>
+          <p:cNvPr id="78" name="Google Shape;78;p17"/>
+          <p:cNvSpPr txBox="1"/>
+          <p:nvPr>
+            <p:ph type="title"/>
+          </p:nvPr>
+        </p:nvSpPr>
+        <p:spPr>
+          <a:xfrm>
+            <a:off x="311700" y="445025"/>
+            <a:ext cx="8520600" cy="572700"/>
+          </a:xfrm>
+          <a:prstGeom prst="rect">
+            <a:avLst/>
+          </a:prstGeom>
+        </p:spPr>
+        <p:txBody>
+          <a:bodyPr anchorCtr="0" anchor="t" bIns="91425" lIns="91425" spcFirstLastPara="1" rIns="91425" wrap="square" tIns="91425">
+            <a:normAutofit fontScale="90000"/>
+          </a:bodyPr>
+          <a:lstStyle/>
+          <a:p>
+            <a:pPr indent="0" lvl="0" marL="0" rtl="0" algn="l">
+              <a:spcBef>
+                <a:spcPts val="0"/>
+              </a:spcBef>
+              <a:spcAft>
+                <a:spcPts val="0"/>
+              </a:spcAft>
+              <a:buNone/>
+            </a:pPr>
+            <a:r>
+              <a:t/>
+            </a:r>
+            <a:endParaRPr/>
+          </a:p>
+        </p:txBody>
+      </p:sp>
+      <p:sp>
+        <p:nvSpPr>
+          <p:cNvPr id="79" name="Google Shape;79;p17"/>
+          <p:cNvSpPr txBox="1"/>
+          <p:nvPr>
+            <p:ph idx="1" type="body"/>
+          </p:nvPr>
+        </p:nvSpPr>
+        <p:spPr>
+          <a:xfrm>
+            <a:off x="311700" y="1152475"/>
+            <a:ext cx="8520600" cy="3416400"/>
+          </a:xfrm>
+          <a:prstGeom prst="rect">
+            <a:avLst/>
+          </a:prstGeom>
+        </p:spPr>
+        <p:txBody>
+          <a:bodyPr anchorCtr="0" anchor="t" bIns="91425" lIns="91425" spcFirstLastPara="1" rIns="91425" wrap="square" tIns="91425">
+            <a:normAutofit/>
+          </a:bodyPr>
+          <a:lstStyle/>
+          <a:p>
+            <a:pPr indent="0" lvl="0" marL="0" rtl="0" algn="l">
+              <a:spcBef>
+                <a:spcPts val="0"/>
+              </a:spcBef>
+              <a:spcAft>
+                <a:spcPts val="1200"/>
+              </a:spcAft>
+              <a:buNone/>
+            </a:pPr>
+            <a:r>
+              <a:t/>
+            </a:r>
+            <a:endParaRPr/>
+          </a:p>
+        </p:txBody>
+      </p:sp>
+    </p:spTree>
+  </p:cSld>
+  <p:clrMapOvr>
+    <a:masterClrMapping/>
+  </p:clrMapOvr>
+</p:sld>
+</file>
+
+<file path=ppt/slides/slide6.xml><?xml version="1.0" encoding="utf-8"?>
+<p:sld xmlns:a="http://schemas.openxmlformats.org/drawingml/2006/main" xmlns:r="http://schemas.openxmlformats.org/officeDocument/2006/relationships" xmlns:mc="http://schemas.openxmlformats.org/markup-compatibility/2006" xmlns:mv="urn:schemas-microsoft-com:mac:vml" xmlns:p="http://schemas.openxmlformats.org/presentationml/2006/main" xmlns:c="http://schemas.openxmlformats.org/drawingml/2006/chart" xmlns:dgm="http://schemas.openxmlformats.org/drawingml/2006/diagram" xmlns:o="urn:schemas-microsoft-com:office:office" xmlns:v="urn:schemas-microsoft-com:vml" xmlns:pvml="urn:schemas-microsoft-com:office:powerpoint" xmlns:com="http://schemas.openxmlformats.org/drawingml/2006/compatibility" xmlns:p14="http://schemas.microsoft.com/office/powerpoint/2010/main" xmlns:p15="http://schemas.microsoft.com/office/powerpoint/2012/main" xmlns:ahyp="http://schemas.microsoft.com/office/drawing/2018/hyperlinkcolor">
+  <p:cSld>
+    <p:spTree>
+      <p:nvGrpSpPr>
+        <p:cNvPr id="83" name="Shape 83"/>
+        <p:cNvGrpSpPr/>
+        <p:nvPr/>
+      </p:nvGrpSpPr>
+      <p:grpSpPr>
+        <a:xfrm>
+          <a:off x="0" y="0"/>
+          <a:ext cx="0" cy="0"/>
+          <a:chOff x="0" y="0"/>
+          <a:chExt cx="0" cy="0"/>
+        </a:xfrm>
+      </p:grpSpPr>
+      <p:sp>
+        <p:nvSpPr>
+          <p:cNvPr id="84" name="Google Shape;84;p18"/>
+          <p:cNvSpPr txBox="1"/>
+          <p:nvPr>
+            <p:ph type="title"/>
+          </p:nvPr>
+        </p:nvSpPr>
+        <p:spPr>
+          <a:xfrm>
+            <a:off x="311700" y="445025"/>
+            <a:ext cx="8520600" cy="572700"/>
+          </a:xfrm>
+          <a:prstGeom prst="rect">
+            <a:avLst/>
+          </a:prstGeom>
+        </p:spPr>
+        <p:txBody>
+          <a:bodyPr anchorCtr="0" anchor="t" bIns="91425" lIns="91425" spcFirstLastPara="1" rIns="91425" wrap="square" tIns="91425">
+            <a:normAutofit fontScale="90000"/>
+          </a:bodyPr>
+          <a:lstStyle/>
+          <a:p>
+            <a:pPr indent="0" lvl="0" marL="0" rtl="0" algn="l">
+              <a:spcBef>
+                <a:spcPts val="0"/>
+              </a:spcBef>
+              <a:spcAft>
+                <a:spcPts val="0"/>
+              </a:spcAft>
+              <a:buNone/>
+            </a:pPr>
+            <a:r>
+              <a:rPr lang="en"/>
+              <a:t>KENNY’S PACKET/DBMANAGER/SERVER/CLIENTHANDLER</a:t>
+            </a:r>
+            <a:endParaRPr/>
+          </a:p>
+        </p:txBody>
+      </p:sp>
+      <p:sp>
+        <p:nvSpPr>
+          <p:cNvPr id="85" name="Google Shape;85;p18"/>
+          <p:cNvSpPr txBox="1"/>
+          <p:nvPr>
+            <p:ph idx="1" type="body"/>
+          </p:nvPr>
+        </p:nvSpPr>
+        <p:spPr>
+          <a:xfrm>
+            <a:off x="311700" y="1152475"/>
+            <a:ext cx="8520600" cy="3416400"/>
+          </a:xfrm>
+          <a:prstGeom prst="rect">
+            <a:avLst/>
+          </a:prstGeom>
+        </p:spPr>
+        <p:txBody>
+          <a:bodyPr anchorCtr="0" anchor="t" bIns="91425" lIns="91425" spcFirstLastPara="1" rIns="91425" wrap="square" tIns="91425">
+            <a:normAutofit/>
+          </a:bodyPr>
+          <a:lstStyle/>
+          <a:p>
+            <a:pPr indent="0" lvl="0" marL="0" rtl="0" algn="l">
+              <a:spcBef>
+                <a:spcPts val="0"/>
+              </a:spcBef>
+              <a:spcAft>
+                <a:spcPts val="1200"/>
+              </a:spcAft>
+              <a:buNone/>
+            </a:pPr>
+            <a:r>
+              <a:rPr lang="en"/>
+              <a:t>ZOHEB’S USER/CHAT/MESSAGE</a:t>
+            </a:r>
+            <a:endParaRPr/>
+          </a:p>
+        </p:txBody>
+      </p:sp>
+    </p:spTree>
+  </p:cSld>
+  <p:clrMapOvr>
+    <a:masterClrMapping/>
+  </p:clrMapOvr>
+</p:sld>
+</file>
+
+<file path=ppt/slides/slide7.xml><?xml version="1.0" encoding="utf-8"?>
+<p:sld xmlns:a="http://schemas.openxmlformats.org/drawingml/2006/main" xmlns:r="http://schemas.openxmlformats.org/officeDocument/2006/relationships" xmlns:mc="http://schemas.openxmlformats.org/markup-compatibility/2006" xmlns:mv="urn:schemas-microsoft-com:mac:vml" xmlns:p="http://schemas.openxmlformats.org/presentationml/2006/main" xmlns:c="http://schemas.openxmlformats.org/drawingml/2006/chart" xmlns:dgm="http://schemas.openxmlformats.org/drawingml/2006/diagram" xmlns:o="urn:schemas-microsoft-com:office:office" xmlns:v="urn:schemas-microsoft-com:vml" xmlns:pvml="urn:schemas-microsoft-com:office:powerpoint" xmlns:com="http://schemas.openxmlformats.org/drawingml/2006/compatibility" xmlns:p14="http://schemas.microsoft.com/office/powerpoint/2010/main" xmlns:p15="http://schemas.microsoft.com/office/powerpoint/2012/main" xmlns:ahyp="http://schemas.microsoft.com/office/drawing/2018/hyperlinkcolor">
+  <p:cSld>
+    <p:spTree>
+      <p:nvGrpSpPr>
+        <p:cNvPr id="89" name="Shape 89"/>
+        <p:cNvGrpSpPr/>
+        <p:nvPr/>
+      </p:nvGrpSpPr>
+      <p:grpSpPr>
+        <a:xfrm>
+          <a:off x="0" y="0"/>
+          <a:ext cx="0" cy="0"/>
+          <a:chOff x="0" y="0"/>
+          <a:chExt cx="0" cy="0"/>
+        </a:xfrm>
+      </p:grpSpPr>
+      <p:sp>
+        <p:nvSpPr>
+          <p:cNvPr id="90" name="Google Shape;90;p19"/>
+          <p:cNvSpPr txBox="1"/>
+          <p:nvPr>
+            <p:ph type="title"/>
+          </p:nvPr>
+        </p:nvSpPr>
+        <p:spPr>
+          <a:xfrm>
+            <a:off x="311700" y="445025"/>
+            <a:ext cx="8520600" cy="572700"/>
+          </a:xfrm>
+          <a:prstGeom prst="rect">
+            <a:avLst/>
+          </a:prstGeom>
+        </p:spPr>
+        <p:txBody>
+          <a:bodyPr anchorCtr="0" anchor="t" bIns="91425" lIns="91425" spcFirstLastPara="1" rIns="91425" wrap="square" tIns="91425">
+            <a:normAutofit fontScale="90000"/>
+          </a:bodyPr>
+          <a:lstStyle/>
+          <a:p>
+            <a:pPr indent="0" lvl="0" marL="0" rtl="0" algn="l">
+              <a:spcBef>
+                <a:spcPts val="0"/>
+              </a:spcBef>
+              <a:spcAft>
+                <a:spcPts val="0"/>
+              </a:spcAft>
+              <a:buNone/>
+            </a:pPr>
+            <a:r>
+              <a:t/>
+            </a:r>
+            <a:endParaRPr/>
+          </a:p>
+        </p:txBody>
+      </p:sp>
+      <p:sp>
+        <p:nvSpPr>
+          <p:cNvPr id="91" name="Google Shape;91;p19"/>
+          <p:cNvSpPr txBox="1"/>
+          <p:nvPr>
+            <p:ph idx="1" type="body"/>
+          </p:nvPr>
+        </p:nvSpPr>
+        <p:spPr>
+          <a:xfrm>
+            <a:off x="311700" y="1152475"/>
+            <a:ext cx="8520600" cy="3416400"/>
+          </a:xfrm>
+          <a:prstGeom prst="rect">
+            <a:avLst/>
+          </a:prstGeom>
+        </p:spPr>
+        <p:txBody>
+          <a:bodyPr anchorCtr="0" anchor="t" bIns="91425" lIns="91425" spcFirstLastPara="1" rIns="91425" wrap="square" tIns="91425">
+            <a:normAutofit/>
+          </a:bodyPr>
+          <a:lstStyle/>
+          <a:p>
+            <a:pPr indent="0" lvl="0" marL="0" rtl="0" algn="l">
+              <a:spcBef>
+                <a:spcPts val="0"/>
+              </a:spcBef>
+              <a:spcAft>
+                <a:spcPts val="1200"/>
+              </a:spcAft>
+              <a:buNone/>
+            </a:pPr>
+            <a:r>
+              <a:t/>
+            </a:r>
+            <a:endParaRPr/>
+          </a:p>
+        </p:txBody>
+      </p:sp>
+    </p:spTree>
+  </p:cSld>
+  <p:clrMapOvr>
+    <a:masterClrMapping/>
+  </p:clrMapOvr>
+</p:sld>
+</file>
+
+<file path=ppt/slides/slide8.xml><?xml version="1.0" encoding="utf-8"?>
+<p:sld xmlns:a="http://schemas.openxmlformats.org/drawingml/2006/main" xmlns:r="http://schemas.openxmlformats.org/officeDocument/2006/relationships" xmlns:mc="http://schemas.openxmlformats.org/markup-compatibility/2006" xmlns:mv="urn:schemas-microsoft-com:mac:vml" xmlns:p="http://schemas.openxmlformats.org/presentationml/2006/main" xmlns:c="http://schemas.openxmlformats.org/drawingml/2006/chart" xmlns:dgm="http://schemas.openxmlformats.org/drawingml/2006/diagram" xmlns:o="urn:schemas-microsoft-com:office:office" xmlns:v="urn:schemas-microsoft-com:vml" xmlns:pvml="urn:schemas-microsoft-com:office:powerpoint" xmlns:com="http://schemas.openxmlformats.org/drawingml/2006/compatibility" xmlns:p14="http://schemas.microsoft.com/office/powerpoint/2010/main" xmlns:p15="http://schemas.microsoft.com/office/powerpoint/2012/main" xmlns:ahyp="http://schemas.microsoft.com/office/drawing/2018/hyperlinkcolor">
+  <p:cSld>
+    <p:spTree>
+      <p:nvGrpSpPr>
+        <p:cNvPr id="95" name="Shape 95"/>
+        <p:cNvGrpSpPr/>
+        <p:nvPr/>
+      </p:nvGrpSpPr>
+      <p:grpSpPr>
+        <a:xfrm>
+          <a:off x="0" y="0"/>
+          <a:ext cx="0" cy="0"/>
+          <a:chOff x="0" y="0"/>
+          <a:chExt cx="0" cy="0"/>
+        </a:xfrm>
+      </p:grpSpPr>
+      <p:sp>
+        <p:nvSpPr>
+          <p:cNvPr id="96" name="Google Shape;96;p20"/>
+          <p:cNvSpPr txBox="1"/>
+          <p:nvPr>
+            <p:ph type="title"/>
+          </p:nvPr>
+        </p:nvSpPr>
+        <p:spPr>
+          <a:xfrm>
+            <a:off x="311700" y="445025"/>
+            <a:ext cx="8520600" cy="572700"/>
+          </a:xfrm>
+          <a:prstGeom prst="rect">
+            <a:avLst/>
+          </a:prstGeom>
+        </p:spPr>
+        <p:txBody>
+          <a:bodyPr anchorCtr="0" anchor="t" bIns="91425" lIns="91425" spcFirstLastPara="1" rIns="91425" wrap="square" tIns="91425">
+            <a:normAutofit fontScale="90000"/>
+          </a:bodyPr>
+          <a:lstStyle/>
+          <a:p>
+            <a:pPr indent="0" lvl="0" marL="0" rtl="0" algn="l">
+              <a:spcBef>
+                <a:spcPts val="0"/>
+              </a:spcBef>
+              <a:spcAft>
+                <a:spcPts val="0"/>
+              </a:spcAft>
+              <a:buNone/>
+            </a:pPr>
+            <a:r>
+              <a:rPr lang="en"/>
+              <a:t>TALHA’S CLIENT/GUI</a:t>
+            </a:r>
+            <a:endParaRPr/>
+          </a:p>
+        </p:txBody>
+      </p:sp>
+      <p:sp>
+        <p:nvSpPr>
+          <p:cNvPr id="97" name="Google Shape;97;p20"/>
+          <p:cNvSpPr txBox="1"/>
+          <p:nvPr>
+            <p:ph idx="1" type="body"/>
+          </p:nvPr>
+        </p:nvSpPr>
+        <p:spPr>
+          <a:xfrm>
+            <a:off x="311700" y="1152475"/>
+            <a:ext cx="8520600" cy="3416400"/>
+          </a:xfrm>
+          <a:prstGeom prst="rect">
+            <a:avLst/>
+          </a:prstGeom>
+        </p:spPr>
+        <p:txBody>
+          <a:bodyPr anchorCtr="0" anchor="t" bIns="91425" lIns="91425" spcFirstLastPara="1" rIns="91425" wrap="square" tIns="91425">
+            <a:normAutofit/>
+          </a:bodyPr>
+          <a:lstStyle/>
+          <a:p>
+            <a:pPr indent="0" lvl="0" marL="0" rtl="0" algn="l">
+              <a:spcBef>
+                <a:spcPts val="0"/>
+              </a:spcBef>
+              <a:spcAft>
+                <a:spcPts val="1200"/>
+              </a:spcAft>
+              <a:buNone/>
+            </a:pPr>
+            <a:r>
+              <a:rPr lang="en"/>
+              <a:t>ZOHEB’S USER/CHAT/MESSAGE</a:t>
+            </a:r>
+            <a:endParaRPr/>
+          </a:p>
+        </p:txBody>
+      </p:sp>
+    </p:spTree>
+  </p:cSld>
+  <p:clrMapOvr>
+    <a:masterClrMapping/>
+  </p:clrMapOvr>
+</p:sld>
+</file>
+
+<file path=ppt/slides/slide9.xml><?xml version="1.0" encoding="utf-8"?>
+<p:sld xmlns:a="http://schemas.openxmlformats.org/drawingml/2006/main" xmlns:r="http://schemas.openxmlformats.org/officeDocument/2006/relationships" xmlns:mc="http://schemas.openxmlformats.org/markup-compatibility/2006" xmlns:mv="urn:schemas-microsoft-com:mac:vml" xmlns:p="http://schemas.openxmlformats.org/presentationml/2006/main" xmlns:c="http://schemas.openxmlformats.org/drawingml/2006/chart" xmlns:dgm="http://schemas.openxmlformats.org/drawingml/2006/diagram" xmlns:o="urn:schemas-microsoft-com:office:office" xmlns:v="urn:schemas-microsoft-com:vml" xmlns:pvml="urn:schemas-microsoft-com:office:powerpoint" xmlns:com="http://schemas.openxmlformats.org/drawingml/2006/compatibility" xmlns:p14="http://schemas.microsoft.com/office/powerpoint/2010/main" xmlns:p15="http://schemas.microsoft.com/office/powerpoint/2012/main" xmlns:ahyp="http://schemas.microsoft.com/office/drawing/2018/hyperlinkcolor">
+  <p:cSld>
+    <p:spTree>
+      <p:nvGrpSpPr>
+        <p:cNvPr id="101" name="Shape 101"/>
+        <p:cNvGrpSpPr/>
+        <p:nvPr/>
+      </p:nvGrpSpPr>
+      <p:grpSpPr>
+        <a:xfrm>
+          <a:off x="0" y="0"/>
+          <a:ext cx="0" cy="0"/>
+          <a:chOff x="0" y="0"/>
+          <a:chExt cx="0" cy="0"/>
+        </a:xfrm>
+      </p:grpSpPr>
+      <p:sp>
+        <p:nvSpPr>
+          <p:cNvPr id="102" name="Google Shape;102;p21"/>
+          <p:cNvSpPr txBox="1"/>
+          <p:nvPr>
+            <p:ph type="title"/>
+          </p:nvPr>
+        </p:nvSpPr>
+        <p:spPr>
+          <a:xfrm>
+            <a:off x="311700" y="445025"/>
+            <a:ext cx="8520600" cy="572700"/>
+          </a:xfrm>
+          <a:prstGeom prst="rect">
+            <a:avLst/>
+          </a:prstGeom>
+        </p:spPr>
+        <p:txBody>
+          <a:bodyPr anchorCtr="0" anchor="t" bIns="91425" lIns="91425" spcFirstLastPara="1" rIns="91425" wrap="square" tIns="91425">
+            <a:normAutofit fontScale="90000"/>
+          </a:bodyPr>
+          <a:lstStyle/>
+          <a:p>
+            <a:pPr indent="0" lvl="0" marL="0" rtl="0" algn="l">
+              <a:spcBef>
+                <a:spcPts val="0"/>
+              </a:spcBef>
+              <a:spcAft>
+                <a:spcPts val="0"/>
+              </a:spcAft>
+              <a:buNone/>
+            </a:pPr>
+            <a:r>
+              <a:t/>
+            </a:r>
+            <a:endParaRPr/>
+          </a:p>
+        </p:txBody>
+      </p:sp>
+      <p:sp>
+        <p:nvSpPr>
+          <p:cNvPr id="103" name="Google Shape;103;p21"/>
+          <p:cNvSpPr txBox="1"/>
+          <p:nvPr>
+            <p:ph idx="1" type="body"/>
+          </p:nvPr>
+        </p:nvSpPr>
+        <p:spPr>
+          <a:xfrm>
+            <a:off x="311700" y="1152475"/>
+            <a:ext cx="8520600" cy="3416400"/>
+          </a:xfrm>
+          <a:prstGeom prst="rect">
+            <a:avLst/>
+          </a:prstGeom>
+        </p:spPr>
+        <p:txBody>
+          <a:bodyPr anchorCtr="0" anchor="t" bIns="91425" lIns="91425" spcFirstLastPara="1" rIns="91425" wrap="square" tIns="91425">
+            <a:normAutofit/>
+          </a:bodyPr>
+          <a:lstStyle/>
+          <a:p>
+            <a:pPr indent="0" lvl="0" marL="0" rtl="0" algn="l">
+              <a:spcBef>
+                <a:spcPts val="0"/>
+              </a:spcBef>
+              <a:spcAft>
+                <a:spcPts val="1200"/>
+              </a:spcAft>
+              <a:buNone/>
+            </a:pPr>
+            <a:r>
+              <a:t/>
+            </a:r>
+            <a:endParaRPr/>
+          </a:p>
+        </p:txBody>
+      </p:sp>
+    </p:spTree>
+  </p:cSld>
+  <p:clrMapOvr>
+    <a:masterClrMapping/>
+  </p:clrMapOvr>
+</p:sld>
+</file>
+
 <file path=ppt/theme/theme1.xml><?xml version="1.0" encoding="utf-8"?>
 <a:theme xmlns:a="http://schemas.openxmlformats.org/drawingml/2006/main" xmlns:r="http://schemas.openxmlformats.org/officeDocument/2006/relationships" name="Simple Light">
   <a:themeElements>

</xml_diff>